<commit_message>
ensemble slides pretty good
</commit_message>
<xml_diff>
--- a/16-ensemble/slides.pptx
+++ b/16-ensemble/slides.pptx
@@ -6,7 +6,7 @@
     <p:sldMasterId id="2147483649" r:id="rId2"/>
   </p:sldMasterIdLst>
   <p:notesMasterIdLst>
-    <p:notesMasterId r:id="rId65"/>
+    <p:notesMasterId r:id="rId61"/>
   </p:notesMasterIdLst>
   <p:sldIdLst>
     <p:sldId id="258" r:id="rId3"/>
@@ -60,17 +60,13 @@
     <p:sldId id="1086" r:id="rId51"/>
     <p:sldId id="1085" r:id="rId52"/>
     <p:sldId id="1087" r:id="rId53"/>
-    <p:sldId id="1090" r:id="rId54"/>
-    <p:sldId id="1088" r:id="rId55"/>
-    <p:sldId id="1105" r:id="rId56"/>
-    <p:sldId id="1106" r:id="rId57"/>
-    <p:sldId id="1094" r:id="rId58"/>
+    <p:sldId id="1104" r:id="rId54"/>
+    <p:sldId id="1090" r:id="rId55"/>
+    <p:sldId id="1094" r:id="rId56"/>
+    <p:sldId id="1105" r:id="rId57"/>
+    <p:sldId id="1106" r:id="rId58"/>
     <p:sldId id="1099" r:id="rId59"/>
-    <p:sldId id="1100" r:id="rId60"/>
-    <p:sldId id="1101" r:id="rId61"/>
-    <p:sldId id="1102" r:id="rId62"/>
-    <p:sldId id="1103" r:id="rId63"/>
-    <p:sldId id="504" r:id="rId64"/>
+    <p:sldId id="504" r:id="rId60"/>
   </p:sldIdLst>
   <p:sldSz cx="9363075" cy="5257800"/>
   <p:notesSz cx="6858000" cy="9144000"/>
@@ -293,7 +289,7 @@
           <a:p>
             <a:fld id="{DB92F479-4B50-F243-9713-1B12EC2B4BDB}" type="datetimeFigureOut">
               <a:rPr lang="en-US" smtClean="0"/>
-              <a:t>3/28/14</a:t>
+              <a:t>4/20/14</a:t>
             </a:fld>
             <a:endParaRPr lang="en-US"/>
           </a:p>
@@ -6002,33 +5998,11 @@
           <a:bodyPr/>
           <a:lstStyle/>
           <a:p>
-            <a:pPr marL="0" marR="0" indent="0" algn="l" defTabSz="457200" rtl="0" eaLnBrk="1" fontAlgn="auto" latinLnBrk="0" hangingPunct="1">
-              <a:lnSpc>
-                <a:spcPct val="100000"/>
-              </a:lnSpc>
-              <a:spcBef>
-                <a:spcPts val="0"/>
-              </a:spcBef>
-              <a:spcAft>
-                <a:spcPts val="0"/>
-              </a:spcAft>
-              <a:buClrTx/>
-              <a:buSzTx/>
-              <a:buFontTx/>
-              <a:buNone/>
-              <a:tabLst/>
-              <a:defRPr/>
-            </a:pPr>
-            <a:r>
-              <a:rPr lang="en-US" sz="1200" baseline="0" dirty="0" smtClean="0">
-                <a:solidFill>
-                  <a:prstClr val="black"/>
-                </a:solidFill>
-                <a:latin typeface="ArialMT"/>
-                <a:sym typeface="Wingdings"/>
-              </a:rPr>
-              <a:t> </a:t>
-            </a:r>
+            <a:r>
+              <a:rPr lang="en-US" dirty="0" smtClean="0"/>
+              <a:t>  </a:t>
+            </a:r>
+            <a:endParaRPr lang="en-US" dirty="0"/>
           </a:p>
         </p:txBody>
       </p:sp>
@@ -6058,7 +6032,7 @@
     </p:spTree>
     <p:extLst>
       <p:ext uri="{BB962C8B-B14F-4D97-AF65-F5344CB8AC3E}">
-        <p14:creationId xmlns:p14="http://schemas.microsoft.com/office/powerpoint/2010/main" val="645762702"/>
+        <p14:creationId xmlns:p14="http://schemas.microsoft.com/office/powerpoint/2010/main" val="158773868"/>
       </p:ext>
     </p:extLst>
   </p:cSld>
@@ -6138,26 +6112,6 @@
                 <a:sym typeface="Wingdings"/>
               </a:rPr>
               <a:t> </a:t>
-            </a:r>
-            <a:r>
-              <a:rPr lang="en-US" sz="1200" baseline="0" dirty="0" err="1" smtClean="0">
-                <a:solidFill>
-                  <a:prstClr val="black"/>
-                </a:solidFill>
-                <a:latin typeface="ArialMT"/>
-                <a:sym typeface="Wingdings"/>
-              </a:rPr>
-              <a:t>AdaBoost</a:t>
-            </a:r>
-            <a:r>
-              <a:rPr lang="en-US" sz="1200" baseline="0" dirty="0" smtClean="0">
-                <a:solidFill>
-                  <a:prstClr val="black"/>
-                </a:solidFill>
-                <a:latin typeface="ArialMT"/>
-                <a:sym typeface="Wingdings"/>
-              </a:rPr>
-              <a:t> = popular implementation</a:t>
             </a:r>
           </a:p>
         </p:txBody>
@@ -6242,11 +6196,33 @@
           <a:bodyPr/>
           <a:lstStyle/>
           <a:p>
-            <a:r>
-              <a:rPr lang="en-US" dirty="0" smtClean="0"/>
-              <a:t>  </a:t>
-            </a:r>
-            <a:endParaRPr lang="en-US" dirty="0"/>
+            <a:pPr marL="0" marR="0" indent="0" algn="l" defTabSz="457200" rtl="0" eaLnBrk="1" fontAlgn="auto" latinLnBrk="0" hangingPunct="1">
+              <a:lnSpc>
+                <a:spcPct val="100000"/>
+              </a:lnSpc>
+              <a:spcBef>
+                <a:spcPts val="0"/>
+              </a:spcBef>
+              <a:spcAft>
+                <a:spcPts val="0"/>
+              </a:spcAft>
+              <a:buClrTx/>
+              <a:buSzTx/>
+              <a:buFontTx/>
+              <a:buNone/>
+              <a:tabLst/>
+              <a:defRPr/>
+            </a:pPr>
+            <a:r>
+              <a:rPr lang="en-US" sz="1200" baseline="0" dirty="0" smtClean="0">
+                <a:solidFill>
+                  <a:prstClr val="black"/>
+                </a:solidFill>
+                <a:latin typeface="ArialMT"/>
+                <a:sym typeface="Wingdings"/>
+              </a:rPr>
+              <a:t> </a:t>
+            </a:r>
           </a:p>
         </p:txBody>
       </p:sp>
@@ -6276,7 +6252,7 @@
     </p:spTree>
     <p:extLst>
       <p:ext uri="{BB962C8B-B14F-4D97-AF65-F5344CB8AC3E}">
-        <p14:creationId xmlns:p14="http://schemas.microsoft.com/office/powerpoint/2010/main" val="158773868"/>
+        <p14:creationId xmlns:p14="http://schemas.microsoft.com/office/powerpoint/2010/main" val="645762702"/>
       </p:ext>
     </p:extLst>
   </p:cSld>
@@ -6440,31 +6416,8 @@
           <a:bodyPr/>
           <a:lstStyle/>
           <a:p>
-            <a:pPr marL="0" marR="0" indent="0" algn="l" defTabSz="457200" rtl="0" eaLnBrk="1" fontAlgn="auto" latinLnBrk="0" hangingPunct="1">
-              <a:lnSpc>
-                <a:spcPct val="100000"/>
-              </a:lnSpc>
-              <a:spcBef>
-                <a:spcPts val="0"/>
-              </a:spcBef>
-              <a:spcAft>
-                <a:spcPts val="0"/>
-              </a:spcAft>
-              <a:buClrTx/>
-              <a:buSzTx/>
-              <a:buFontTx/>
-              <a:buNone/>
-              <a:tabLst/>
-              <a:defRPr/>
-            </a:pPr>
-            <a:r>
-              <a:rPr lang="en-US" sz="1200" baseline="0" dirty="0" smtClean="0">
-                <a:solidFill>
-                  <a:prstClr val="black"/>
-                </a:solidFill>
-                <a:latin typeface="ArialMT"/>
-                <a:sym typeface="Wingdings"/>
-              </a:rPr>
+            <a:r>
+              <a:rPr lang="en-US" baseline="0" dirty="0" smtClean="0"/>
               <a:t> </a:t>
             </a:r>
           </a:p>
@@ -6496,117 +6449,7 @@
     </p:spTree>
     <p:extLst>
       <p:ext uri="{BB962C8B-B14F-4D97-AF65-F5344CB8AC3E}">
-        <p14:creationId xmlns:p14="http://schemas.microsoft.com/office/powerpoint/2010/main" val="645762702"/>
-      </p:ext>
-    </p:extLst>
-  </p:cSld>
-  <p:clrMapOvr>
-    <a:masterClrMapping/>
-  </p:clrMapOvr>
-</p:notes>
-</file>
-
-<file path=ppt/notesSlides/notesSlide59.xml><?xml version="1.0" encoding="utf-8"?>
-<p:notes xmlns:a="http://schemas.openxmlformats.org/drawingml/2006/main" xmlns:r="http://schemas.openxmlformats.org/officeDocument/2006/relationships" xmlns:p="http://schemas.openxmlformats.org/presentationml/2006/main">
-  <p:cSld>
-    <p:spTree>
-      <p:nvGrpSpPr>
-        <p:cNvPr id="1" name=""/>
-        <p:cNvGrpSpPr/>
-        <p:nvPr/>
-      </p:nvGrpSpPr>
-      <p:grpSpPr>
-        <a:xfrm>
-          <a:off x="0" y="0"/>
-          <a:ext cx="0" cy="0"/>
-          <a:chOff x="0" y="0"/>
-          <a:chExt cx="0" cy="0"/>
-        </a:xfrm>
-      </p:grpSpPr>
-      <p:sp>
-        <p:nvSpPr>
-          <p:cNvPr id="2" name="Slide Image Placeholder 1"/>
-          <p:cNvSpPr>
-            <a:spLocks noGrp="1" noRot="1" noChangeAspect="1"/>
-          </p:cNvSpPr>
-          <p:nvPr>
-            <p:ph type="sldImg"/>
-          </p:nvPr>
-        </p:nvSpPr>
-        <p:spPr/>
-      </p:sp>
-      <p:sp>
-        <p:nvSpPr>
-          <p:cNvPr id="3" name="Notes Placeholder 2"/>
-          <p:cNvSpPr>
-            <a:spLocks noGrp="1"/>
-          </p:cNvSpPr>
-          <p:nvPr>
-            <p:ph type="body" idx="1"/>
-          </p:nvPr>
-        </p:nvSpPr>
-        <p:spPr/>
-        <p:txBody>
-          <a:bodyPr/>
-          <a:lstStyle/>
-          <a:p>
-            <a:pPr marL="0" marR="0" indent="0" algn="l" defTabSz="457200" rtl="0" eaLnBrk="1" fontAlgn="auto" latinLnBrk="0" hangingPunct="1">
-              <a:lnSpc>
-                <a:spcPct val="100000"/>
-              </a:lnSpc>
-              <a:spcBef>
-                <a:spcPts val="0"/>
-              </a:spcBef>
-              <a:spcAft>
-                <a:spcPts val="0"/>
-              </a:spcAft>
-              <a:buClrTx/>
-              <a:buSzTx/>
-              <a:buFontTx/>
-              <a:buNone/>
-              <a:tabLst/>
-              <a:defRPr/>
-            </a:pPr>
-            <a:r>
-              <a:rPr lang="en-US" sz="1200" baseline="0" dirty="0" smtClean="0">
-                <a:solidFill>
-                  <a:prstClr val="black"/>
-                </a:solidFill>
-                <a:latin typeface="ArialMT"/>
-                <a:sym typeface="Wingdings"/>
-              </a:rPr>
-              <a:t> </a:t>
-            </a:r>
-          </a:p>
-        </p:txBody>
-      </p:sp>
-      <p:sp>
-        <p:nvSpPr>
-          <p:cNvPr id="4" name="Slide Number Placeholder 3"/>
-          <p:cNvSpPr>
-            <a:spLocks noGrp="1"/>
-          </p:cNvSpPr>
-          <p:nvPr>
-            <p:ph type="sldNum" sz="quarter" idx="10"/>
-          </p:nvPr>
-        </p:nvSpPr>
-        <p:spPr/>
-        <p:txBody>
-          <a:bodyPr/>
-          <a:lstStyle/>
-          <a:p>
-            <a:fld id="{ADD4B5B7-85EF-4E48-AC80-2380FACD9C23}" type="slidenum">
-              <a:rPr lang="en-US" smtClean="0"/>
-              <a:t>59</a:t>
-            </a:fld>
-            <a:endParaRPr lang="en-US"/>
-          </a:p>
-        </p:txBody>
-      </p:sp>
-    </p:spTree>
-    <p:extLst>
-      <p:ext uri="{BB962C8B-B14F-4D97-AF65-F5344CB8AC3E}">
-        <p14:creationId xmlns:p14="http://schemas.microsoft.com/office/powerpoint/2010/main" val="645762702"/>
+        <p14:creationId xmlns:p14="http://schemas.microsoft.com/office/powerpoint/2010/main" val="158773868"/>
       </p:ext>
     </p:extLst>
   </p:cSld>
@@ -6717,313 +6560,6 @@
     <p:extLst>
       <p:ext uri="{BB962C8B-B14F-4D97-AF65-F5344CB8AC3E}">
         <p14:creationId xmlns:p14="http://schemas.microsoft.com/office/powerpoint/2010/main" val="645762702"/>
-      </p:ext>
-    </p:extLst>
-  </p:cSld>
-  <p:clrMapOvr>
-    <a:masterClrMapping/>
-  </p:clrMapOvr>
-</p:notes>
-</file>
-
-<file path=ppt/notesSlides/notesSlide60.xml><?xml version="1.0" encoding="utf-8"?>
-<p:notes xmlns:a="http://schemas.openxmlformats.org/drawingml/2006/main" xmlns:r="http://schemas.openxmlformats.org/officeDocument/2006/relationships" xmlns:p="http://schemas.openxmlformats.org/presentationml/2006/main">
-  <p:cSld>
-    <p:spTree>
-      <p:nvGrpSpPr>
-        <p:cNvPr id="1" name=""/>
-        <p:cNvGrpSpPr/>
-        <p:nvPr/>
-      </p:nvGrpSpPr>
-      <p:grpSpPr>
-        <a:xfrm>
-          <a:off x="0" y="0"/>
-          <a:ext cx="0" cy="0"/>
-          <a:chOff x="0" y="0"/>
-          <a:chExt cx="0" cy="0"/>
-        </a:xfrm>
-      </p:grpSpPr>
-      <p:sp>
-        <p:nvSpPr>
-          <p:cNvPr id="2" name="Slide Image Placeholder 1"/>
-          <p:cNvSpPr>
-            <a:spLocks noGrp="1" noRot="1" noChangeAspect="1"/>
-          </p:cNvSpPr>
-          <p:nvPr>
-            <p:ph type="sldImg"/>
-          </p:nvPr>
-        </p:nvSpPr>
-        <p:spPr/>
-      </p:sp>
-      <p:sp>
-        <p:nvSpPr>
-          <p:cNvPr id="3" name="Notes Placeholder 2"/>
-          <p:cNvSpPr>
-            <a:spLocks noGrp="1"/>
-          </p:cNvSpPr>
-          <p:nvPr>
-            <p:ph type="body" idx="1"/>
-          </p:nvPr>
-        </p:nvSpPr>
-        <p:spPr/>
-        <p:txBody>
-          <a:bodyPr/>
-          <a:lstStyle/>
-          <a:p>
-            <a:pPr marL="0" marR="0" indent="0" algn="l" defTabSz="457200" rtl="0" eaLnBrk="1" fontAlgn="auto" latinLnBrk="0" hangingPunct="1">
-              <a:lnSpc>
-                <a:spcPct val="100000"/>
-              </a:lnSpc>
-              <a:spcBef>
-                <a:spcPts val="0"/>
-              </a:spcBef>
-              <a:spcAft>
-                <a:spcPts val="0"/>
-              </a:spcAft>
-              <a:buClrTx/>
-              <a:buSzTx/>
-              <a:buFontTx/>
-              <a:buNone/>
-              <a:tabLst/>
-              <a:defRPr/>
-            </a:pPr>
-            <a:r>
-              <a:rPr lang="en-US" sz="1200" baseline="0" dirty="0" smtClean="0">
-                <a:solidFill>
-                  <a:prstClr val="black"/>
-                </a:solidFill>
-                <a:latin typeface="ArialMT"/>
-                <a:sym typeface="Wingdings"/>
-              </a:rPr>
-              <a:t> </a:t>
-            </a:r>
-          </a:p>
-        </p:txBody>
-      </p:sp>
-      <p:sp>
-        <p:nvSpPr>
-          <p:cNvPr id="4" name="Slide Number Placeholder 3"/>
-          <p:cNvSpPr>
-            <a:spLocks noGrp="1"/>
-          </p:cNvSpPr>
-          <p:nvPr>
-            <p:ph type="sldNum" sz="quarter" idx="10"/>
-          </p:nvPr>
-        </p:nvSpPr>
-        <p:spPr/>
-        <p:txBody>
-          <a:bodyPr/>
-          <a:lstStyle/>
-          <a:p>
-            <a:fld id="{ADD4B5B7-85EF-4E48-AC80-2380FACD9C23}" type="slidenum">
-              <a:rPr lang="en-US" smtClean="0"/>
-              <a:t>60</a:t>
-            </a:fld>
-            <a:endParaRPr lang="en-US"/>
-          </a:p>
-        </p:txBody>
-      </p:sp>
-    </p:spTree>
-    <p:extLst>
-      <p:ext uri="{BB962C8B-B14F-4D97-AF65-F5344CB8AC3E}">
-        <p14:creationId xmlns:p14="http://schemas.microsoft.com/office/powerpoint/2010/main" val="645762702"/>
-      </p:ext>
-    </p:extLst>
-  </p:cSld>
-  <p:clrMapOvr>
-    <a:masterClrMapping/>
-  </p:clrMapOvr>
-</p:notes>
-</file>
-
-<file path=ppt/notesSlides/notesSlide61.xml><?xml version="1.0" encoding="utf-8"?>
-<p:notes xmlns:a="http://schemas.openxmlformats.org/drawingml/2006/main" xmlns:r="http://schemas.openxmlformats.org/officeDocument/2006/relationships" xmlns:p="http://schemas.openxmlformats.org/presentationml/2006/main">
-  <p:cSld>
-    <p:spTree>
-      <p:nvGrpSpPr>
-        <p:cNvPr id="1" name=""/>
-        <p:cNvGrpSpPr/>
-        <p:nvPr/>
-      </p:nvGrpSpPr>
-      <p:grpSpPr>
-        <a:xfrm>
-          <a:off x="0" y="0"/>
-          <a:ext cx="0" cy="0"/>
-          <a:chOff x="0" y="0"/>
-          <a:chExt cx="0" cy="0"/>
-        </a:xfrm>
-      </p:grpSpPr>
-      <p:sp>
-        <p:nvSpPr>
-          <p:cNvPr id="2" name="Slide Image Placeholder 1"/>
-          <p:cNvSpPr>
-            <a:spLocks noGrp="1" noRot="1" noChangeAspect="1"/>
-          </p:cNvSpPr>
-          <p:nvPr>
-            <p:ph type="sldImg"/>
-          </p:nvPr>
-        </p:nvSpPr>
-        <p:spPr/>
-      </p:sp>
-      <p:sp>
-        <p:nvSpPr>
-          <p:cNvPr id="3" name="Notes Placeholder 2"/>
-          <p:cNvSpPr>
-            <a:spLocks noGrp="1"/>
-          </p:cNvSpPr>
-          <p:nvPr>
-            <p:ph type="body" idx="1"/>
-          </p:nvPr>
-        </p:nvSpPr>
-        <p:spPr/>
-        <p:txBody>
-          <a:bodyPr/>
-          <a:lstStyle/>
-          <a:p>
-            <a:pPr marL="0" marR="0" indent="0" algn="l" defTabSz="457200" rtl="0" eaLnBrk="1" fontAlgn="auto" latinLnBrk="0" hangingPunct="1">
-              <a:lnSpc>
-                <a:spcPct val="100000"/>
-              </a:lnSpc>
-              <a:spcBef>
-                <a:spcPts val="0"/>
-              </a:spcBef>
-              <a:spcAft>
-                <a:spcPts val="0"/>
-              </a:spcAft>
-              <a:buClrTx/>
-              <a:buSzTx/>
-              <a:buFontTx/>
-              <a:buNone/>
-              <a:tabLst/>
-              <a:defRPr/>
-            </a:pPr>
-            <a:r>
-              <a:rPr lang="en-US" sz="1200" baseline="0" dirty="0" smtClean="0">
-                <a:solidFill>
-                  <a:prstClr val="black"/>
-                </a:solidFill>
-                <a:latin typeface="ArialMT"/>
-                <a:sym typeface="Wingdings"/>
-              </a:rPr>
-              <a:t> </a:t>
-            </a:r>
-          </a:p>
-        </p:txBody>
-      </p:sp>
-      <p:sp>
-        <p:nvSpPr>
-          <p:cNvPr id="4" name="Slide Number Placeholder 3"/>
-          <p:cNvSpPr>
-            <a:spLocks noGrp="1"/>
-          </p:cNvSpPr>
-          <p:nvPr>
-            <p:ph type="sldNum" sz="quarter" idx="10"/>
-          </p:nvPr>
-        </p:nvSpPr>
-        <p:spPr/>
-        <p:txBody>
-          <a:bodyPr/>
-          <a:lstStyle/>
-          <a:p>
-            <a:fld id="{ADD4B5B7-85EF-4E48-AC80-2380FACD9C23}" type="slidenum">
-              <a:rPr lang="en-US" smtClean="0"/>
-              <a:t>61</a:t>
-            </a:fld>
-            <a:endParaRPr lang="en-US"/>
-          </a:p>
-        </p:txBody>
-      </p:sp>
-    </p:spTree>
-    <p:extLst>
-      <p:ext uri="{BB962C8B-B14F-4D97-AF65-F5344CB8AC3E}">
-        <p14:creationId xmlns:p14="http://schemas.microsoft.com/office/powerpoint/2010/main" val="645762702"/>
-      </p:ext>
-    </p:extLst>
-  </p:cSld>
-  <p:clrMapOvr>
-    <a:masterClrMapping/>
-  </p:clrMapOvr>
-</p:notes>
-</file>
-
-<file path=ppt/notesSlides/notesSlide62.xml><?xml version="1.0" encoding="utf-8"?>
-<p:notes xmlns:a="http://schemas.openxmlformats.org/drawingml/2006/main" xmlns:r="http://schemas.openxmlformats.org/officeDocument/2006/relationships" xmlns:p="http://schemas.openxmlformats.org/presentationml/2006/main">
-  <p:cSld>
-    <p:spTree>
-      <p:nvGrpSpPr>
-        <p:cNvPr id="1" name=""/>
-        <p:cNvGrpSpPr/>
-        <p:nvPr/>
-      </p:nvGrpSpPr>
-      <p:grpSpPr>
-        <a:xfrm>
-          <a:off x="0" y="0"/>
-          <a:ext cx="0" cy="0"/>
-          <a:chOff x="0" y="0"/>
-          <a:chExt cx="0" cy="0"/>
-        </a:xfrm>
-      </p:grpSpPr>
-      <p:sp>
-        <p:nvSpPr>
-          <p:cNvPr id="2" name="Slide Image Placeholder 1"/>
-          <p:cNvSpPr>
-            <a:spLocks noGrp="1" noRot="1" noChangeAspect="1"/>
-          </p:cNvSpPr>
-          <p:nvPr>
-            <p:ph type="sldImg"/>
-          </p:nvPr>
-        </p:nvSpPr>
-        <p:spPr/>
-      </p:sp>
-      <p:sp>
-        <p:nvSpPr>
-          <p:cNvPr id="3" name="Notes Placeholder 2"/>
-          <p:cNvSpPr>
-            <a:spLocks noGrp="1"/>
-          </p:cNvSpPr>
-          <p:nvPr>
-            <p:ph type="body" idx="1"/>
-          </p:nvPr>
-        </p:nvSpPr>
-        <p:spPr/>
-        <p:txBody>
-          <a:bodyPr/>
-          <a:lstStyle/>
-          <a:p>
-            <a:r>
-              <a:rPr lang="en-US" baseline="0" dirty="0" smtClean="0"/>
-              <a:t> </a:t>
-            </a:r>
-          </a:p>
-        </p:txBody>
-      </p:sp>
-      <p:sp>
-        <p:nvSpPr>
-          <p:cNvPr id="4" name="Slide Number Placeholder 3"/>
-          <p:cNvSpPr>
-            <a:spLocks noGrp="1"/>
-          </p:cNvSpPr>
-          <p:nvPr>
-            <p:ph type="sldNum" sz="quarter" idx="10"/>
-          </p:nvPr>
-        </p:nvSpPr>
-        <p:spPr/>
-        <p:txBody>
-          <a:bodyPr/>
-          <a:lstStyle/>
-          <a:p>
-            <a:fld id="{ADD4B5B7-85EF-4E48-AC80-2380FACD9C23}" type="slidenum">
-              <a:rPr lang="en-US" smtClean="0"/>
-              <a:t>62</a:t>
-            </a:fld>
-            <a:endParaRPr lang="en-US"/>
-          </a:p>
-        </p:txBody>
-      </p:sp>
-    </p:spTree>
-    <p:extLst>
-      <p:ext uri="{BB962C8B-B14F-4D97-AF65-F5344CB8AC3E}">
-        <p14:creationId xmlns:p14="http://schemas.microsoft.com/office/powerpoint/2010/main" val="158773868"/>
       </p:ext>
     </p:extLst>
   </p:cSld>
@@ -13804,11 +13340,7 @@
             </a:br>
             <a:r>
               <a:rPr lang="en-US" sz="5000" dirty="0" smtClean="0"/>
-              <a:t>ensemble </a:t>
-            </a:r>
-            <a:r>
-              <a:rPr lang="en-US" sz="5000" dirty="0" smtClean="0"/>
-              <a:t>techniques</a:t>
+              <a:t>ensemble techniques</a:t>
             </a:r>
             <a:endParaRPr lang="en-US" sz="5000" dirty="0"/>
           </a:p>
@@ -25311,7 +24843,7 @@
     </p:spTree>
     <p:extLst>
       <p:ext uri="{BB962C8B-B14F-4D97-AF65-F5344CB8AC3E}">
-        <p14:creationId xmlns:p14="http://schemas.microsoft.com/office/powerpoint/2010/main" val="3890144822"/>
+        <p14:creationId xmlns:p14="http://schemas.microsoft.com/office/powerpoint/2010/main" val="463873797"/>
       </p:ext>
     </p:extLst>
   </p:cSld>
@@ -25417,7 +24949,7 @@
         <p:spPr>
           <a:xfrm>
             <a:off x="566737" y="1028700"/>
-            <a:ext cx="8382000" cy="1015663"/>
+            <a:ext cx="8382000" cy="3477875"/>
           </a:xfrm>
           <a:prstGeom prst="rect">
             <a:avLst/>
@@ -25432,58 +24964,282 @@
           <a:p>
             <a:pPr algn="l"/>
             <a:r>
-              <a:rPr lang="en-US" sz="3000" dirty="0">
-                <a:latin typeface="PFDinTextCompPro-Italic"/>
-                <a:cs typeface="PFDinTextCompPro-Italic"/>
-              </a:rPr>
-              <a:t>Updating the sampling distribution </a:t>
-            </a:r>
-            <a:r>
               <a:rPr lang="en-US" sz="3000" dirty="0" smtClean="0">
                 <a:latin typeface="PFDinTextCompPro-Italic"/>
                 <a:cs typeface="PFDinTextCompPro-Italic"/>
               </a:rPr>
-              <a:t>and forming an ensemble prediction leads </a:t>
-            </a:r>
-            <a:r>
-              <a:rPr lang="en-US" sz="3000" dirty="0">
-                <a:latin typeface="PFDinTextCompPro-Italic"/>
-                <a:cs typeface="PFDinTextCompPro-Italic"/>
-              </a:rPr>
-              <a:t>to a </a:t>
-            </a:r>
-            <a:r>
-              <a:rPr lang="en-US" sz="3000" i="1" dirty="0">
-                <a:latin typeface="PFDinTextCompPro-Italic"/>
-                <a:cs typeface="PFDinTextCompPro-Italic"/>
-              </a:rPr>
-              <a:t>nonlinear combination</a:t>
-            </a:r>
-            <a:r>
-              <a:rPr lang="en-US" sz="3000" dirty="0">
-                <a:latin typeface="PFDinTextCompPro-Italic"/>
-                <a:cs typeface="PFDinTextCompPro-Italic"/>
-              </a:rPr>
-              <a:t> of the base classifiers</a:t>
-            </a:r>
+              <a:t>Like in bagging, sampling is done with replacement, and as a result some records may not appear in a given training sample.</a:t>
+            </a:r>
+          </a:p>
+          <a:p>
+            <a:pPr algn="l"/>
+            <a:endParaRPr lang="en-US" sz="2000" dirty="0">
+              <a:latin typeface="PFDinTextCompPro-Italic"/>
+              <a:cs typeface="PFDinTextCompPro-Italic"/>
+            </a:endParaRPr>
+          </a:p>
+          <a:p>
+            <a:pPr algn="l"/>
             <a:r>
               <a:rPr lang="en-US" sz="3000" dirty="0" smtClean="0">
                 <a:latin typeface="PFDinTextCompPro-Italic"/>
                 <a:cs typeface="PFDinTextCompPro-Italic"/>
               </a:rPr>
-              <a:t>.</a:t>
-            </a:r>
-            <a:endParaRPr lang="en-US" sz="3000" dirty="0">
+              <a:t>These omitted records will likely be misclassified, and given greater weight in subsequent iterations once the sampling distribution is updated.</a:t>
+            </a:r>
+          </a:p>
+          <a:p>
+            <a:pPr algn="l"/>
+            <a:endParaRPr lang="en-US" sz="2000" dirty="0">
               <a:latin typeface="PFDinTextCompPro-Italic"/>
               <a:cs typeface="PFDinTextCompPro-Italic"/>
             </a:endParaRPr>
           </a:p>
-        </p:txBody>
-      </p:sp>
+          <a:p>
+            <a:pPr algn="l"/>
+            <a:r>
+              <a:rPr lang="en-US" sz="3000" dirty="0" smtClean="0">
+                <a:latin typeface="PFDinTextCompPro-Italic"/>
+                <a:cs typeface="PFDinTextCompPro-Italic"/>
+              </a:rPr>
+              <a:t>So even if a record is left out at one stage, it will be emphasized later.</a:t>
+            </a:r>
+          </a:p>
+        </p:txBody>
+      </p:sp>
+      <p:grpSp>
+        <p:nvGrpSpPr>
+          <p:cNvPr id="5" name="Group 26"/>
+          <p:cNvGrpSpPr>
+            <a:grpSpLocks/>
+          </p:cNvGrpSpPr>
+          <p:nvPr/>
+        </p:nvGrpSpPr>
+        <p:grpSpPr bwMode="auto">
+          <a:xfrm>
+            <a:off x="7577137" y="3543300"/>
+            <a:ext cx="1463675" cy="1588294"/>
+            <a:chOff x="0" y="0"/>
+            <a:chExt cx="1280" cy="1160"/>
+          </a:xfrm>
+        </p:grpSpPr>
+        <p:pic>
+          <p:nvPicPr>
+            <p:cNvPr id="6" name="Picture 23"/>
+            <p:cNvPicPr>
+              <a:picLocks noChangeAspect="1" noChangeArrowheads="1"/>
+            </p:cNvPicPr>
+            <p:nvPr/>
+          </p:nvPicPr>
+          <p:blipFill>
+            <a:blip r:embed="rId3">
+              <a:extLst>
+                <a:ext uri="{28A0092B-C50C-407E-A947-70E740481C1C}">
+                  <a14:useLocalDpi xmlns:a14="http://schemas.microsoft.com/office/drawing/2010/main" val="0"/>
+                </a:ext>
+              </a:extLst>
+            </a:blip>
+            <a:srcRect/>
+            <a:stretch>
+              <a:fillRect/>
+            </a:stretch>
+          </p:blipFill>
+          <p:spPr bwMode="auto">
+            <a:xfrm>
+              <a:off x="0" y="0"/>
+              <a:ext cx="1280" cy="890"/>
+            </a:xfrm>
+            <a:prstGeom prst="rect">
+              <a:avLst/>
+            </a:prstGeom>
+            <a:noFill/>
+            <a:ln>
+              <a:noFill/>
+            </a:ln>
+            <a:extLst>
+              <a:ext uri="{909E8E84-426E-40dd-AFC4-6F175D3DCCD1}">
+                <a14:hiddenFill xmlns:a14="http://schemas.microsoft.com/office/drawing/2010/main">
+                  <a:solidFill>
+                    <a:srgbClr val="FFFFFF"/>
+                  </a:solidFill>
+                </a14:hiddenFill>
+              </a:ext>
+              <a:ext uri="{91240B29-F687-4f45-9708-019B960494DF}">
+                <a14:hiddenLine xmlns:a14="http://schemas.microsoft.com/office/drawing/2010/main" w="12700">
+                  <a:solidFill>
+                    <a:schemeClr val="tx1"/>
+                  </a:solidFill>
+                  <a:miter lim="800000"/>
+                  <a:headEnd/>
+                  <a:tailEnd/>
+                </a14:hiddenLine>
+              </a:ext>
+            </a:extLst>
+          </p:spPr>
+        </p:pic>
+        <p:sp>
+          <p:nvSpPr>
+            <p:cNvPr id="7" name="Rectangle 24"/>
+            <p:cNvSpPr>
+              <a:spLocks/>
+            </p:cNvSpPr>
+            <p:nvPr/>
+          </p:nvSpPr>
+          <p:spPr bwMode="auto">
+            <a:xfrm>
+              <a:off x="104" y="96"/>
+              <a:ext cx="1056" cy="152"/>
+            </a:xfrm>
+            <a:prstGeom prst="rect">
+              <a:avLst/>
+            </a:prstGeom>
+            <a:noFill/>
+            <a:ln>
+              <a:noFill/>
+            </a:ln>
+            <a:extLst>
+              <a:ext uri="{909E8E84-426E-40dd-AFC4-6F175D3DCCD1}">
+                <a14:hiddenFill xmlns:a14="http://schemas.microsoft.com/office/drawing/2010/main">
+                  <a:solidFill>
+                    <a:srgbClr val="FFFFFF"/>
+                  </a:solidFill>
+                </a14:hiddenFill>
+              </a:ext>
+              <a:ext uri="{91240B29-F687-4f45-9708-019B960494DF}">
+                <a14:hiddenLine xmlns:a14="http://schemas.microsoft.com/office/drawing/2010/main" w="12700">
+                  <a:solidFill>
+                    <a:schemeClr val="tx1"/>
+                  </a:solidFill>
+                  <a:miter lim="800000"/>
+                  <a:headEnd/>
+                  <a:tailEnd/>
+                </a14:hiddenLine>
+              </a:ext>
+            </a:extLst>
+          </p:spPr>
+          <p:txBody>
+            <a:bodyPr lIns="0" tIns="0" rIns="0" bIns="0"/>
+            <a:lstStyle/>
+            <a:p>
+              <a:pPr algn="l">
+                <a:lnSpc>
+                  <a:spcPct val="75000"/>
+                </a:lnSpc>
+              </a:pPr>
+              <a:r>
+                <a:rPr lang="en-US" sz="1300" dirty="0" smtClean="0">
+                  <a:solidFill>
+                    <a:schemeClr val="tx1"/>
+                  </a:solidFill>
+                  <a:latin typeface="PFDinTextCompPro-Bold" charset="0"/>
+                  <a:ea typeface="ＭＳ Ｐゴシック" charset="0"/>
+                  <a:cs typeface="ＭＳ Ｐゴシック" charset="0"/>
+                  <a:sym typeface="PFDinTextCompPro-Bold" charset="0"/>
+                </a:rPr>
+                <a:t>NOTE</a:t>
+              </a:r>
+              <a:endParaRPr lang="en-US" sz="1300" dirty="0">
+                <a:solidFill>
+                  <a:schemeClr val="tx1"/>
+                </a:solidFill>
+                <a:latin typeface="PFDinTextCompPro-Bold" charset="0"/>
+                <a:ea typeface="ＭＳ Ｐゴシック" charset="0"/>
+                <a:cs typeface="ＭＳ Ｐゴシック" charset="0"/>
+                <a:sym typeface="PFDinTextCompPro-Bold" charset="0"/>
+              </a:endParaRPr>
+            </a:p>
+          </p:txBody>
+        </p:sp>
+        <p:sp>
+          <p:nvSpPr>
+            <p:cNvPr id="10" name="Rectangle 25"/>
+            <p:cNvSpPr>
+              <a:spLocks/>
+            </p:cNvSpPr>
+            <p:nvPr/>
+          </p:nvSpPr>
+          <p:spPr bwMode="auto">
+            <a:xfrm>
+              <a:off x="104" y="264"/>
+              <a:ext cx="1056" cy="896"/>
+            </a:xfrm>
+            <a:prstGeom prst="rect">
+              <a:avLst/>
+            </a:prstGeom>
+            <a:noFill/>
+            <a:ln>
+              <a:noFill/>
+            </a:ln>
+            <a:extLst>
+              <a:ext uri="{909E8E84-426E-40dd-AFC4-6F175D3DCCD1}">
+                <a14:hiddenFill xmlns:a14="http://schemas.microsoft.com/office/drawing/2010/main">
+                  <a:solidFill>
+                    <a:srgbClr val="FFFFFF"/>
+                  </a:solidFill>
+                </a14:hiddenFill>
+              </a:ext>
+              <a:ext uri="{91240B29-F687-4f45-9708-019B960494DF}">
+                <a14:hiddenLine xmlns:a14="http://schemas.microsoft.com/office/drawing/2010/main" w="12700">
+                  <a:solidFill>
+                    <a:schemeClr val="tx1"/>
+                  </a:solidFill>
+                  <a:miter lim="800000"/>
+                  <a:headEnd/>
+                  <a:tailEnd/>
+                </a14:hiddenLine>
+              </a:ext>
+            </a:extLst>
+          </p:spPr>
+          <p:txBody>
+            <a:bodyPr lIns="0" tIns="0" rIns="0" bIns="0"/>
+            <a:lstStyle/>
+            <a:p>
+              <a:pPr algn="l">
+                <a:lnSpc>
+                  <a:spcPts val="1150"/>
+                </a:lnSpc>
+              </a:pPr>
+              <a:r>
+                <a:rPr lang="en-US" sz="900" dirty="0" err="1" smtClean="0">
+                  <a:solidFill>
+                    <a:schemeClr val="tx1"/>
+                  </a:solidFill>
+                  <a:latin typeface="+mn-lt"/>
+                  <a:ea typeface="ＭＳ Ｐゴシック" charset="0"/>
+                  <a:cs typeface="PFDinTextCompPro-Italic"/>
+                  <a:sym typeface="News706 BT" charset="0"/>
+                </a:rPr>
+                <a:t>AdaBoost</a:t>
+              </a:r>
+              <a:r>
+                <a:rPr lang="en-US" sz="900" dirty="0" smtClean="0">
+                  <a:solidFill>
+                    <a:schemeClr val="tx1"/>
+                  </a:solidFill>
+                  <a:latin typeface="+mn-lt"/>
+                  <a:ea typeface="ＭＳ Ｐゴシック" charset="0"/>
+                  <a:cs typeface="PFDinTextCompPro-Italic"/>
+                  <a:sym typeface="News706 BT" charset="0"/>
+                </a:rPr>
+                <a:t> is a popular boosting algorithm.</a:t>
+              </a:r>
+              <a:endParaRPr lang="en-US" sz="900" dirty="0" smtClean="0">
+                <a:solidFill>
+                  <a:schemeClr val="tx1"/>
+                </a:solidFill>
+                <a:latin typeface="+mn-lt"/>
+                <a:ea typeface="ＭＳ Ｐゴシック" charset="0"/>
+                <a:cs typeface="PFDinTextCompPro-Italic"/>
+                <a:sym typeface="News706 BT" charset="0"/>
+              </a:endParaRPr>
+            </a:p>
+          </p:txBody>
+        </p:sp>
+      </p:grpSp>
     </p:spTree>
     <p:extLst>
       <p:ext uri="{BB962C8B-B14F-4D97-AF65-F5344CB8AC3E}">
-        <p14:creationId xmlns:p14="http://schemas.microsoft.com/office/powerpoint/2010/main" val="2144834427"/>
+        <p14:creationId xmlns:p14="http://schemas.microsoft.com/office/powerpoint/2010/main" val="3890144822"/>
       </p:ext>
     </p:extLst>
   </p:cSld>
@@ -25520,162 +25276,87 @@
       </p:grpSpPr>
       <p:sp>
         <p:nvSpPr>
-          <p:cNvPr id="4" name="Content Placeholder 3"/>
-          <p:cNvSpPr>
-            <a:spLocks noGrp="1"/>
-          </p:cNvSpPr>
-          <p:nvPr>
-            <p:ph sz="quarter" idx="11"/>
+          <p:cNvPr id="2" name="Title 1"/>
+          <p:cNvSpPr>
+            <a:spLocks noGrp="1"/>
+          </p:cNvSpPr>
+          <p:nvPr>
+            <p:ph type="title"/>
           </p:nvPr>
         </p:nvSpPr>
         <p:spPr>
           <a:xfrm>
-            <a:off x="414337" y="495300"/>
+            <a:off x="347663" y="3238500"/>
+            <a:ext cx="8426450" cy="1828800"/>
+          </a:xfrm>
+        </p:spPr>
+        <p:txBody>
+          <a:bodyPr/>
+          <a:lstStyle/>
+          <a:p>
+            <a:pPr>
+              <a:defRPr/>
+            </a:pPr>
+            <a:r>
+              <a:rPr lang="en-US" sz="7500" dirty="0"/>
+              <a:t/>
+            </a:r>
+            <a:br>
+              <a:rPr lang="en-US" sz="7500" dirty="0"/>
+            </a:br>
+            <a:r>
+              <a:rPr lang="en-US" sz="7500" dirty="0" smtClean="0"/>
+              <a:t>V. random forests</a:t>
+            </a:r>
+            <a:endParaRPr lang="en-US" sz="7500" dirty="0"/>
+          </a:p>
+        </p:txBody>
+      </p:sp>
+      <p:sp>
+        <p:nvSpPr>
+          <p:cNvPr id="4" name="Content Placeholder 3"/>
+          <p:cNvSpPr>
+            <a:spLocks noGrp="1"/>
+          </p:cNvSpPr>
+          <p:nvPr>
+            <p:ph sz="quarter" idx="11"/>
+          </p:nvPr>
+        </p:nvSpPr>
+        <p:spPr>
+          <a:xfrm>
+            <a:off x="371475" y="495300"/>
             <a:ext cx="6400800" cy="304800"/>
           </a:xfrm>
         </p:spPr>
         <p:txBody>
-          <a:bodyPr/>
-          <a:lstStyle/>
-          <a:p>
-            <a:pPr eaLnBrk="1" hangingPunct="1">
-              <a:lnSpc>
-                <a:spcPts val="2448"/>
-              </a:lnSpc>
-              <a:defRPr/>
-            </a:pPr>
-            <a:r>
-              <a:rPr lang="en-US" dirty="0"/>
-              <a:t>boosting</a:t>
-            </a:r>
-          </a:p>
-        </p:txBody>
-      </p:sp>
-      <p:sp>
-        <p:nvSpPr>
-          <p:cNvPr id="8" name="Slide Number Placeholder 3"/>
-          <p:cNvSpPr>
-            <a:spLocks noGrp="1"/>
-          </p:cNvSpPr>
-          <p:nvPr>
-            <p:ph type="sldNum" sz="quarter" idx="13"/>
-          </p:nvPr>
-        </p:nvSpPr>
-        <p:spPr/>
-        <p:txBody>
-          <a:bodyPr/>
-          <a:lstStyle/>
-          <a:p>
-            <a:pPr>
-              <a:defRPr/>
-            </a:pPr>
-            <a:fld id="{BD5AD749-DAD1-6A4A-A2AA-CB20EAD0AEB7}" type="slidenum">
-              <a:rPr lang="en-US"/>
-              <a:pPr>
-                <a:defRPr/>
-              </a:pPr>
-              <a:t>54</a:t>
-            </a:fld>
-            <a:endParaRPr lang="en-US"/>
-          </a:p>
-        </p:txBody>
-      </p:sp>
-      <p:sp>
-        <p:nvSpPr>
-          <p:cNvPr id="9" name="TextBox 8"/>
-          <p:cNvSpPr txBox="1"/>
-          <p:nvPr/>
-        </p:nvSpPr>
-        <p:spPr>
-          <a:xfrm>
-            <a:off x="566737" y="1028700"/>
-            <a:ext cx="8382000" cy="2400657"/>
-          </a:xfrm>
-          <a:prstGeom prst="rect">
-            <a:avLst/>
-          </a:prstGeom>
-          <a:noFill/>
-        </p:spPr>
-        <p:txBody>
-          <a:bodyPr wrap="square" rtlCol="0">
-            <a:spAutoFit/>
+          <a:bodyPr wrap="square" lIns="91440" tIns="45720" rIns="91440" bIns="45720" numCol="1" anchor="t" anchorCtr="0" compatLnSpc="1">
+            <a:prstTxWarp prst="textNoShape">
+              <a:avLst/>
+            </a:prstTxWarp>
           </a:bodyPr>
           <a:lstStyle/>
           <a:p>
-            <a:pPr algn="l"/>
-            <a:r>
-              <a:rPr lang="en-US" sz="3000" dirty="0">
-                <a:latin typeface="PFDinTextCompPro-Italic"/>
-                <a:cs typeface="PFDinTextCompPro-Italic"/>
-              </a:rPr>
-              <a:t>Updating the sampling distribution </a:t>
-            </a:r>
-            <a:r>
-              <a:rPr lang="en-US" sz="3000" dirty="0" smtClean="0">
-                <a:latin typeface="PFDinTextCompPro-Italic"/>
-                <a:cs typeface="PFDinTextCompPro-Italic"/>
-              </a:rPr>
-              <a:t>and forming an ensemble prediction leads </a:t>
-            </a:r>
-            <a:r>
-              <a:rPr lang="en-US" sz="3000" dirty="0">
-                <a:latin typeface="PFDinTextCompPro-Italic"/>
-                <a:cs typeface="PFDinTextCompPro-Italic"/>
-              </a:rPr>
-              <a:t>to a </a:t>
-            </a:r>
-            <a:r>
-              <a:rPr lang="en-US" sz="3000" i="1" dirty="0">
-                <a:latin typeface="PFDinTextCompPro-Italic"/>
-                <a:cs typeface="PFDinTextCompPro-Italic"/>
-              </a:rPr>
-              <a:t>nonlinear combination</a:t>
-            </a:r>
-            <a:r>
-              <a:rPr lang="en-US" sz="3000" dirty="0">
-                <a:latin typeface="PFDinTextCompPro-Italic"/>
-                <a:cs typeface="PFDinTextCompPro-Italic"/>
-              </a:rPr>
-              <a:t> of the base classifiers.</a:t>
-            </a:r>
-          </a:p>
-          <a:p>
-            <a:pPr algn="l"/>
-            <a:endParaRPr lang="en-US" sz="3000" dirty="0" smtClean="0">
-              <a:latin typeface="PFDinTextCompPro-Italic"/>
-              <a:cs typeface="PFDinTextCompPro-Italic"/>
+            <a:pPr marL="0" indent="0"/>
+            <a:r>
+              <a:rPr lang="en-US" cap="none" dirty="0" smtClean="0">
+                <a:latin typeface="PFDinTextCompPro-Bold" charset="0"/>
+                <a:ea typeface="ヒラギノ角ゴ ProN W3" charset="0"/>
+                <a:cs typeface="ヒラギノ角ゴ ProN W3" charset="0"/>
+              </a:rPr>
+              <a:t>INTRO TO DATA SCIENCE</a:t>
+            </a:r>
+            <a:endParaRPr lang="en-US" cap="none" dirty="0">
+              <a:latin typeface="PFDinTextCompPro-Bold" charset="0"/>
+              <a:ea typeface="ヒラギノ角ゴ ProN W3" charset="0"/>
+              <a:cs typeface="ヒラギノ角ゴ ProN W3" charset="0"/>
             </a:endParaRPr>
-          </a:p>
-          <a:p>
-            <a:pPr algn="l"/>
-            <a:r>
-              <a:rPr lang="en-US" sz="3000" dirty="0" smtClean="0">
-                <a:latin typeface="PFDinTextCompPro-Italic"/>
-                <a:cs typeface="PFDinTextCompPro-Italic"/>
-              </a:rPr>
-              <a:t>By explicitly trying to optimize the weighted ensemble vote, boosting attacks the </a:t>
-            </a:r>
-            <a:r>
-              <a:rPr lang="en-US" sz="3000" i="1" dirty="0" smtClean="0">
-                <a:latin typeface="PFDinTextCompPro-Italic"/>
-                <a:cs typeface="PFDinTextCompPro-Italic"/>
-              </a:rPr>
-              <a:t>representation problem</a:t>
-            </a:r>
-            <a:r>
-              <a:rPr lang="en-US" sz="3000" dirty="0" smtClean="0">
-                <a:latin typeface="PFDinTextCompPro-Italic"/>
-                <a:cs typeface="PFDinTextCompPro-Italic"/>
-              </a:rPr>
-              <a:t> head-on.</a:t>
-            </a:r>
           </a:p>
         </p:txBody>
       </p:sp>
     </p:spTree>
     <p:extLst>
       <p:ext uri="{BB962C8B-B14F-4D97-AF65-F5344CB8AC3E}">
-        <p14:creationId xmlns:p14="http://schemas.microsoft.com/office/powerpoint/2010/main" val="1066291018"/>
+        <p14:creationId xmlns:p14="http://schemas.microsoft.com/office/powerpoint/2010/main" val="3435651352"/>
       </p:ext>
     </p:extLst>
   </p:cSld>
@@ -25737,9 +25418,10 @@
               <a:defRPr/>
             </a:pPr>
             <a:r>
-              <a:rPr lang="en-US" dirty="0"/>
-              <a:t>boosting</a:t>
-            </a:r>
+              <a:rPr lang="en-US" dirty="0" smtClean="0"/>
+              <a:t>Random forests</a:t>
+            </a:r>
+            <a:endParaRPr lang="en-US" dirty="0"/>
           </a:p>
         </p:txBody>
       </p:sp>
@@ -25781,7 +25463,7 @@
         <p:spPr>
           <a:xfrm>
             <a:off x="566737" y="1028700"/>
-            <a:ext cx="8382000" cy="2400657"/>
+            <a:ext cx="8382000" cy="1631216"/>
           </a:xfrm>
           <a:prstGeom prst="rect">
             <a:avLst/>
@@ -25796,78 +25478,40 @@
           <a:p>
             <a:pPr algn="l"/>
             <a:r>
-              <a:rPr lang="en-US" sz="3000" dirty="0">
+              <a:rPr lang="en-US" sz="2500" dirty="0" smtClean="0">
                 <a:latin typeface="PFDinTextCompPro-Italic"/>
                 <a:cs typeface="PFDinTextCompPro-Italic"/>
               </a:rPr>
-              <a:t>Updating the sampling distribution </a:t>
-            </a:r>
-            <a:r>
-              <a:rPr lang="en-US" sz="3000" dirty="0" smtClean="0">
+              <a:t>A random forest is an ensemble of decision </a:t>
+            </a:r>
+            <a:r>
+              <a:rPr lang="en-US" sz="2500" dirty="0" smtClean="0">
                 <a:latin typeface="PFDinTextCompPro-Italic"/>
                 <a:cs typeface="PFDinTextCompPro-Italic"/>
               </a:rPr>
-              <a:t>and forming an ensemble prediction leads </a:t>
-            </a:r>
-            <a:r>
-              <a:rPr lang="en-US" sz="3000" dirty="0">
-                <a:latin typeface="PFDinTextCompPro-Italic"/>
-                <a:cs typeface="PFDinTextCompPro-Italic"/>
-              </a:rPr>
-              <a:t>to a </a:t>
-            </a:r>
-            <a:r>
-              <a:rPr lang="en-US" sz="3000" i="1" dirty="0">
-                <a:latin typeface="PFDinTextCompPro-Italic"/>
-                <a:cs typeface="PFDinTextCompPro-Italic"/>
-              </a:rPr>
-              <a:t>nonlinear combination</a:t>
-            </a:r>
-            <a:r>
-              <a:rPr lang="en-US" sz="3000" dirty="0">
-                <a:latin typeface="PFDinTextCompPro-Italic"/>
-                <a:cs typeface="PFDinTextCompPro-Italic"/>
-              </a:rPr>
-              <a:t> of the base classifiers.</a:t>
+              <a:t>trees that vote to determine the final classification.</a:t>
             </a:r>
           </a:p>
           <a:p>
             <a:pPr algn="l"/>
-            <a:endParaRPr lang="en-US" sz="3000" dirty="0" smtClean="0">
+            <a:endParaRPr lang="en-US" sz="2500" dirty="0">
               <a:latin typeface="PFDinTextCompPro-Italic"/>
               <a:cs typeface="PFDinTextCompPro-Italic"/>
             </a:endParaRPr>
           </a:p>
           <a:p>
             <a:pPr algn="l"/>
-            <a:r>
-              <a:rPr lang="en-US" sz="3000" dirty="0" smtClean="0">
-                <a:latin typeface="PFDinTextCompPro-Italic"/>
-                <a:cs typeface="PFDinTextCompPro-Italic"/>
-              </a:rPr>
-              <a:t>By explicitly trying to optimize the weighted ensemble vote, boosting attacks the </a:t>
-            </a:r>
-            <a:r>
-              <a:rPr lang="en-US" sz="3000" i="1" dirty="0" smtClean="0">
-                <a:latin typeface="PFDinTextCompPro-Italic"/>
-                <a:cs typeface="PFDinTextCompPro-Italic"/>
-              </a:rPr>
-              <a:t>representation problem</a:t>
-            </a:r>
-            <a:r>
-              <a:rPr lang="en-US" sz="3000" dirty="0" smtClean="0">
-                <a:latin typeface="PFDinTextCompPro-Italic"/>
-                <a:cs typeface="PFDinTextCompPro-Italic"/>
-              </a:rPr>
-              <a:t> head-on.</a:t>
-            </a:r>
+            <a:endParaRPr lang="en-US" sz="2500" dirty="0">
+              <a:latin typeface="PFDinTextCompPro-Italic"/>
+              <a:cs typeface="PFDinTextCompPro-Italic"/>
+            </a:endParaRPr>
           </a:p>
         </p:txBody>
       </p:sp>
     </p:spTree>
     <p:extLst>
       <p:ext uri="{BB962C8B-B14F-4D97-AF65-F5344CB8AC3E}">
-        <p14:creationId xmlns:p14="http://schemas.microsoft.com/office/powerpoint/2010/main" val="1066291018"/>
+        <p14:creationId xmlns:p14="http://schemas.microsoft.com/office/powerpoint/2010/main" val="2346226892"/>
       </p:ext>
     </p:extLst>
   </p:cSld>
@@ -25904,20 +25548,49 @@
       </p:grpSpPr>
       <p:sp>
         <p:nvSpPr>
-          <p:cNvPr id="2" name="Title 1"/>
-          <p:cNvSpPr>
-            <a:spLocks noGrp="1"/>
-          </p:cNvSpPr>
-          <p:nvPr>
-            <p:ph type="title"/>
+          <p:cNvPr id="4" name="Content Placeholder 3"/>
+          <p:cNvSpPr>
+            <a:spLocks noGrp="1"/>
+          </p:cNvSpPr>
+          <p:nvPr>
+            <p:ph sz="quarter" idx="11"/>
           </p:nvPr>
         </p:nvSpPr>
         <p:spPr>
           <a:xfrm>
-            <a:off x="347663" y="3238500"/>
-            <a:ext cx="8426450" cy="1828800"/>
+            <a:off x="414337" y="495300"/>
+            <a:ext cx="6400800" cy="304800"/>
           </a:xfrm>
         </p:spPr>
+        <p:txBody>
+          <a:bodyPr/>
+          <a:lstStyle/>
+          <a:p>
+            <a:pPr eaLnBrk="1" hangingPunct="1">
+              <a:lnSpc>
+                <a:spcPts val="2448"/>
+              </a:lnSpc>
+              <a:defRPr/>
+            </a:pPr>
+            <a:r>
+              <a:rPr lang="en-US" dirty="0" smtClean="0"/>
+              <a:t>Random forests</a:t>
+            </a:r>
+            <a:endParaRPr lang="en-US" dirty="0"/>
+          </a:p>
+        </p:txBody>
+      </p:sp>
+      <p:sp>
+        <p:nvSpPr>
+          <p:cNvPr id="8" name="Slide Number Placeholder 3"/>
+          <p:cNvSpPr>
+            <a:spLocks noGrp="1"/>
+          </p:cNvSpPr>
+          <p:nvPr>
+            <p:ph type="sldNum" sz="quarter" idx="13"/>
+          </p:nvPr>
+        </p:nvSpPr>
+        <p:spPr/>
         <p:txBody>
           <a:bodyPr/>
           <a:lstStyle/>
@@ -25925,58 +25598,77 @@
             <a:pPr>
               <a:defRPr/>
             </a:pPr>
-            <a:r>
-              <a:rPr lang="en-US" sz="7500" dirty="0"/>
-              <a:t/>
-            </a:r>
-            <a:br>
-              <a:rPr lang="en-US" sz="7500" dirty="0"/>
-            </a:br>
-            <a:r>
-              <a:rPr lang="en-US" sz="7500" dirty="0" smtClean="0"/>
-              <a:t>V. random forests</a:t>
-            </a:r>
-            <a:endParaRPr lang="en-US" sz="7500" dirty="0"/>
-          </a:p>
-        </p:txBody>
-      </p:sp>
-      <p:sp>
-        <p:nvSpPr>
-          <p:cNvPr id="4" name="Content Placeholder 3"/>
-          <p:cNvSpPr>
-            <a:spLocks noGrp="1"/>
-          </p:cNvSpPr>
-          <p:nvPr>
-            <p:ph sz="quarter" idx="11"/>
-          </p:nvPr>
+            <a:fld id="{BD5AD749-DAD1-6A4A-A2AA-CB20EAD0AEB7}" type="slidenum">
+              <a:rPr lang="en-US"/>
+              <a:pPr>
+                <a:defRPr/>
+              </a:pPr>
+              <a:t>56</a:t>
+            </a:fld>
+            <a:endParaRPr lang="en-US"/>
+          </a:p>
+        </p:txBody>
+      </p:sp>
+      <p:sp>
+        <p:nvSpPr>
+          <p:cNvPr id="9" name="TextBox 8"/>
+          <p:cNvSpPr txBox="1"/>
+          <p:nvPr/>
         </p:nvSpPr>
         <p:spPr>
           <a:xfrm>
-            <a:off x="371475" y="495300"/>
-            <a:ext cx="6400800" cy="304800"/>
+            <a:off x="566737" y="1028700"/>
+            <a:ext cx="8382000" cy="2785378"/>
           </a:xfrm>
+          <a:prstGeom prst="rect">
+            <a:avLst/>
+          </a:prstGeom>
+          <a:noFill/>
         </p:spPr>
         <p:txBody>
-          <a:bodyPr wrap="square" lIns="91440" tIns="45720" rIns="91440" bIns="45720" numCol="1" anchor="t" anchorCtr="0" compatLnSpc="1">
-            <a:prstTxWarp prst="textNoShape">
-              <a:avLst/>
-            </a:prstTxWarp>
+          <a:bodyPr wrap="square" rtlCol="0">
+            <a:spAutoFit/>
           </a:bodyPr>
           <a:lstStyle/>
           <a:p>
-            <a:pPr marL="0" indent="0"/>
-            <a:r>
-              <a:rPr lang="en-US" cap="none" dirty="0" smtClean="0">
-                <a:latin typeface="PFDinTextCompPro-Bold" charset="0"/>
-                <a:ea typeface="ヒラギノ角ゴ ProN W3" charset="0"/>
-                <a:cs typeface="ヒラギノ角ゴ ProN W3" charset="0"/>
-              </a:rPr>
-              <a:t>INTRO TO DATA SCIENCE</a:t>
-            </a:r>
-            <a:endParaRPr lang="en-US" cap="none" dirty="0">
-              <a:latin typeface="PFDinTextCompPro-Bold" charset="0"/>
-              <a:ea typeface="ヒラギノ角ゴ ProN W3" charset="0"/>
-              <a:cs typeface="ヒラギノ角ゴ ProN W3" charset="0"/>
+            <a:pPr algn="l"/>
+            <a:r>
+              <a:rPr lang="en-US" sz="2500" dirty="0" smtClean="0">
+                <a:latin typeface="PFDinTextCompPro-Italic"/>
+                <a:cs typeface="PFDinTextCompPro-Italic"/>
+              </a:rPr>
+              <a:t>A random forest is an ensemble of decision </a:t>
+            </a:r>
+            <a:r>
+              <a:rPr lang="en-US" sz="2500" dirty="0" smtClean="0">
+                <a:latin typeface="PFDinTextCompPro-Italic"/>
+                <a:cs typeface="PFDinTextCompPro-Italic"/>
+              </a:rPr>
+              <a:t>trees that vote to determine the final classification.</a:t>
+            </a:r>
+          </a:p>
+          <a:p>
+            <a:pPr algn="l"/>
+            <a:endParaRPr lang="en-US" sz="2500" dirty="0">
+              <a:latin typeface="PFDinTextCompPro-Italic"/>
+              <a:cs typeface="PFDinTextCompPro-Italic"/>
+            </a:endParaRPr>
+          </a:p>
+          <a:p>
+            <a:pPr algn="l"/>
+            <a:r>
+              <a:rPr lang="en-US" sz="2500" dirty="0" smtClean="0">
+                <a:latin typeface="PFDinTextCompPro-Italic"/>
+                <a:cs typeface="PFDinTextCompPro-Italic"/>
+              </a:rPr>
+              <a:t>There are many ways to get random trees. The most common is to take bootstrap training set and also restrict tree growth to a random subset of features for each split.</a:t>
+            </a:r>
+          </a:p>
+          <a:p>
+            <a:pPr algn="l"/>
+            <a:endParaRPr lang="en-US" sz="2500" dirty="0">
+              <a:latin typeface="PFDinTextCompPro-Italic"/>
+              <a:cs typeface="PFDinTextCompPro-Italic"/>
             </a:endParaRPr>
           </a:p>
         </p:txBody>
@@ -25984,7 +25676,7 @@
     </p:spTree>
     <p:extLst>
       <p:ext uri="{BB962C8B-B14F-4D97-AF65-F5344CB8AC3E}">
-        <p14:creationId xmlns:p14="http://schemas.microsoft.com/office/powerpoint/2010/main" val="3435651352"/>
+        <p14:creationId xmlns:p14="http://schemas.microsoft.com/office/powerpoint/2010/main" val="2346226892"/>
       </p:ext>
     </p:extLst>
   </p:cSld>
@@ -26091,7 +25783,7 @@
         <p:spPr>
           <a:xfrm>
             <a:off x="566737" y="1028700"/>
-            <a:ext cx="8382000" cy="861774"/>
+            <a:ext cx="8382000" cy="3554819"/>
           </a:xfrm>
           <a:prstGeom prst="rect">
             <a:avLst/>
@@ -26110,8 +25802,67 @@
                 <a:latin typeface="PFDinTextCompPro-Italic"/>
                 <a:cs typeface="PFDinTextCompPro-Italic"/>
               </a:rPr>
-              <a:t>A random forest is an ensemble of decision trees where each base classifier is grown using a random effect.</a:t>
-            </a:r>
+              <a:t>A random forest is an ensemble of decision </a:t>
+            </a:r>
+            <a:r>
+              <a:rPr lang="en-US" sz="2500" dirty="0" smtClean="0">
+                <a:latin typeface="PFDinTextCompPro-Italic"/>
+                <a:cs typeface="PFDinTextCompPro-Italic"/>
+              </a:rPr>
+              <a:t>trees that vote to determine the final classification.</a:t>
+            </a:r>
+          </a:p>
+          <a:p>
+            <a:pPr algn="l"/>
+            <a:endParaRPr lang="en-US" sz="2500" dirty="0">
+              <a:latin typeface="PFDinTextCompPro-Italic"/>
+              <a:cs typeface="PFDinTextCompPro-Italic"/>
+            </a:endParaRPr>
+          </a:p>
+          <a:p>
+            <a:pPr algn="l"/>
+            <a:r>
+              <a:rPr lang="en-US" sz="2500" dirty="0" smtClean="0">
+                <a:latin typeface="PFDinTextCompPro-Italic"/>
+                <a:cs typeface="PFDinTextCompPro-Italic"/>
+              </a:rPr>
+              <a:t>There are many ways to get random trees. The most common is to take bootstrap training set and also restrict tree growth to a random subset of features for each split.</a:t>
+            </a:r>
+          </a:p>
+          <a:p>
+            <a:pPr algn="l"/>
+            <a:endParaRPr lang="en-US" sz="2500" dirty="0">
+              <a:latin typeface="PFDinTextCompPro-Italic"/>
+              <a:cs typeface="PFDinTextCompPro-Italic"/>
+            </a:endParaRPr>
+          </a:p>
+          <a:p>
+            <a:pPr algn="l"/>
+            <a:r>
+              <a:rPr lang="en-US" sz="2500" dirty="0" smtClean="0">
+                <a:latin typeface="PFDinTextCompPro-Italic"/>
+                <a:cs typeface="PFDinTextCompPro-Italic"/>
+              </a:rPr>
+              <a:t>Other methods: Randomly generate quadratic features, randomly choose the exact feature to split on, </a:t>
+            </a:r>
+            <a:r>
+              <a:rPr lang="en-US" sz="2500" dirty="0" err="1" smtClean="0">
+                <a:latin typeface="PFDinTextCompPro-Italic"/>
+                <a:cs typeface="PFDinTextCompPro-Italic"/>
+              </a:rPr>
+              <a:t>sklearn’s</a:t>
+            </a:r>
+            <a:r>
+              <a:rPr lang="en-US" sz="2500" dirty="0" smtClean="0">
+                <a:latin typeface="PFDinTextCompPro-Italic"/>
+                <a:cs typeface="PFDinTextCompPro-Italic"/>
+              </a:rPr>
+              <a:t> “extremely random forest” technique, etc.</a:t>
+            </a:r>
+            <a:endParaRPr lang="en-US" sz="2500" dirty="0" smtClean="0">
+              <a:latin typeface="PFDinTextCompPro-Italic"/>
+              <a:cs typeface="PFDinTextCompPro-Italic"/>
+            </a:endParaRPr>
           </a:p>
         </p:txBody>
       </p:sp>
@@ -26155,159 +25906,80 @@
       </p:grpSpPr>
       <p:sp>
         <p:nvSpPr>
-          <p:cNvPr id="4" name="Content Placeholder 3"/>
-          <p:cNvSpPr>
-            <a:spLocks noGrp="1"/>
-          </p:cNvSpPr>
-          <p:nvPr>
-            <p:ph sz="quarter" idx="11"/>
+          <p:cNvPr id="2" name="Title 1"/>
+          <p:cNvSpPr>
+            <a:spLocks noGrp="1"/>
+          </p:cNvSpPr>
+          <p:nvPr>
+            <p:ph type="title"/>
           </p:nvPr>
         </p:nvSpPr>
         <p:spPr>
           <a:xfrm>
-            <a:off x="414337" y="495300"/>
+            <a:off x="347663" y="3467100"/>
+            <a:ext cx="8426450" cy="1828800"/>
+          </a:xfrm>
+        </p:spPr>
+        <p:txBody>
+          <a:bodyPr/>
+          <a:lstStyle/>
+          <a:p>
+            <a:pPr>
+              <a:defRPr/>
+            </a:pPr>
+            <a:r>
+              <a:rPr lang="en-US" sz="7500" dirty="0" smtClean="0"/>
+              <a:t>Ex: ensemble methods in </a:t>
+            </a:r>
+            <a:r>
+              <a:rPr lang="en-US" sz="7500" dirty="0" err="1" smtClean="0"/>
+              <a:t>scikit</a:t>
+            </a:r>
+            <a:r>
+              <a:rPr lang="en-US" sz="7500" dirty="0" smtClean="0"/>
+              <a:t>-learn</a:t>
+            </a:r>
+            <a:endParaRPr lang="en-US" sz="7500" dirty="0"/>
+          </a:p>
+        </p:txBody>
+      </p:sp>
+      <p:sp>
+        <p:nvSpPr>
+          <p:cNvPr id="4" name="Content Placeholder 3"/>
+          <p:cNvSpPr>
+            <a:spLocks noGrp="1"/>
+          </p:cNvSpPr>
+          <p:nvPr>
+            <p:ph sz="quarter" idx="11"/>
+          </p:nvPr>
+        </p:nvSpPr>
+        <p:spPr>
+          <a:xfrm>
+            <a:off x="371475" y="495300"/>
             <a:ext cx="6400800" cy="304800"/>
           </a:xfrm>
         </p:spPr>
         <p:txBody>
-          <a:bodyPr/>
-          <a:lstStyle/>
-          <a:p>
-            <a:pPr eaLnBrk="1" hangingPunct="1">
-              <a:lnSpc>
-                <a:spcPts val="2448"/>
-              </a:lnSpc>
-              <a:defRPr/>
-            </a:pPr>
-            <a:r>
-              <a:rPr lang="en-US" dirty="0" smtClean="0"/>
-              <a:t>Random forests</a:t>
-            </a:r>
-            <a:endParaRPr lang="en-US" dirty="0"/>
-          </a:p>
-        </p:txBody>
-      </p:sp>
-      <p:sp>
-        <p:nvSpPr>
-          <p:cNvPr id="8" name="Slide Number Placeholder 3"/>
-          <p:cNvSpPr>
-            <a:spLocks noGrp="1"/>
-          </p:cNvSpPr>
-          <p:nvPr>
-            <p:ph type="sldNum" sz="quarter" idx="13"/>
-          </p:nvPr>
-        </p:nvSpPr>
-        <p:spPr/>
-        <p:txBody>
-          <a:bodyPr/>
-          <a:lstStyle/>
-          <a:p>
-            <a:pPr>
-              <a:defRPr/>
-            </a:pPr>
-            <a:fld id="{BD5AD749-DAD1-6A4A-A2AA-CB20EAD0AEB7}" type="slidenum">
-              <a:rPr lang="en-US"/>
-              <a:pPr>
-                <a:defRPr/>
-              </a:pPr>
-              <a:t>58</a:t>
-            </a:fld>
-            <a:endParaRPr lang="en-US"/>
-          </a:p>
-        </p:txBody>
-      </p:sp>
-      <p:sp>
-        <p:nvSpPr>
-          <p:cNvPr id="9" name="TextBox 8"/>
-          <p:cNvSpPr txBox="1"/>
-          <p:nvPr/>
-        </p:nvSpPr>
-        <p:spPr>
-          <a:xfrm>
-            <a:off x="566737" y="1028700"/>
-            <a:ext cx="8382000" cy="2015936"/>
-          </a:xfrm>
-          <a:prstGeom prst="rect">
-            <a:avLst/>
-          </a:prstGeom>
-          <a:noFill/>
-        </p:spPr>
-        <p:txBody>
-          <a:bodyPr wrap="square" rtlCol="0">
-            <a:spAutoFit/>
+          <a:bodyPr wrap="square" lIns="91440" tIns="45720" rIns="91440" bIns="45720" numCol="1" anchor="t" anchorCtr="0" compatLnSpc="1">
+            <a:prstTxWarp prst="textNoShape">
+              <a:avLst/>
+            </a:prstTxWarp>
           </a:bodyPr>
           <a:lstStyle/>
           <a:p>
-            <a:pPr algn="l"/>
-            <a:r>
-              <a:rPr lang="en-US" sz="2500" dirty="0" smtClean="0">
-                <a:latin typeface="PFDinTextCompPro-Italic"/>
-                <a:cs typeface="PFDinTextCompPro-Italic"/>
-              </a:rPr>
-              <a:t>A random forest is an ensemble of decision trees where each base classifier is grown using a random effect.</a:t>
-            </a:r>
-          </a:p>
-          <a:p>
-            <a:pPr algn="l"/>
-            <a:endParaRPr lang="en-US" sz="2500" dirty="0">
-              <a:latin typeface="PFDinTextCompPro-Italic"/>
-              <a:cs typeface="PFDinTextCompPro-Italic"/>
-            </a:endParaRPr>
-          </a:p>
-          <a:p>
-            <a:pPr algn="l"/>
-            <a:r>
-              <a:rPr lang="en-US" sz="2500" dirty="0" smtClean="0">
-                <a:latin typeface="PFDinTextCompPro-Italic"/>
-                <a:cs typeface="PFDinTextCompPro-Italic"/>
-              </a:rPr>
-              <a:t>One way to do this is to randomly choose </a:t>
-            </a:r>
-            <a:r>
-              <a:rPr lang="en-US" sz="2500" dirty="0">
-                <a:latin typeface="PFDinTextCompPro-Italic"/>
-                <a:cs typeface="PFDinTextCompPro-Italic"/>
-              </a:rPr>
-              <a:t>one of the top </a:t>
-            </a:r>
-            <a:r>
-              <a:rPr lang="en-US" sz="2500" i="1" dirty="0">
-                <a:latin typeface="+mn-lt"/>
-                <a:cs typeface="PFDinTextCompPro-Italic"/>
-              </a:rPr>
-              <a:t>k</a:t>
-            </a:r>
-            <a:r>
-              <a:rPr lang="en-US" sz="2500" dirty="0">
-                <a:latin typeface="PFDinTextCompPro-Italic"/>
-                <a:cs typeface="PFDinTextCompPro-Italic"/>
-              </a:rPr>
-              <a:t> </a:t>
-            </a:r>
-            <a:r>
-              <a:rPr lang="en-US" sz="2500" dirty="0" smtClean="0">
-                <a:latin typeface="PFDinTextCompPro-Italic"/>
-                <a:cs typeface="PFDinTextCompPro-Italic"/>
-              </a:rPr>
-              <a:t>features to split each </a:t>
-            </a:r>
-            <a:r>
-              <a:rPr lang="en-US" sz="2500" dirty="0">
-                <a:latin typeface="PFDinTextCompPro-Italic"/>
-                <a:cs typeface="PFDinTextCompPro-Italic"/>
-              </a:rPr>
-              <a:t>node</a:t>
-            </a:r>
-            <a:r>
-              <a:rPr lang="en-US" sz="2500" dirty="0" smtClean="0">
-                <a:latin typeface="PFDinTextCompPro-Italic"/>
-                <a:cs typeface="PFDinTextCompPro-Italic"/>
-              </a:rPr>
-              <a:t>.</a:t>
-            </a:r>
-            <a:endParaRPr lang="en-US" sz="2500" dirty="0">
-              <a:latin typeface="PFDinTextCompPro-Italic"/>
-              <a:cs typeface="PFDinTextCompPro-Italic"/>
+            <a:pPr marL="0" indent="0"/>
+            <a:r>
+              <a:rPr lang="en-US" cap="none" dirty="0" smtClean="0">
+                <a:latin typeface="PFDinTextCompPro-Bold" charset="0"/>
+                <a:ea typeface="ヒラギノ角ゴ ProN W3" charset="0"/>
+                <a:cs typeface="ヒラギノ角ゴ ProN W3" charset="0"/>
+              </a:rPr>
+              <a:t>INTRO TO DATA SCIENCE</a:t>
+            </a:r>
+            <a:endParaRPr lang="en-US" cap="none" dirty="0">
+              <a:latin typeface="PFDinTextCompPro-Bold" charset="0"/>
+              <a:ea typeface="ヒラギノ角ゴ ProN W3" charset="0"/>
+              <a:cs typeface="ヒラギノ角ゴ ProN W3" charset="0"/>
             </a:endParaRPr>
           </a:p>
         </p:txBody>
@@ -26315,235 +25987,7 @@
     </p:spTree>
     <p:extLst>
       <p:ext uri="{BB962C8B-B14F-4D97-AF65-F5344CB8AC3E}">
-        <p14:creationId xmlns:p14="http://schemas.microsoft.com/office/powerpoint/2010/main" val="1994573487"/>
-      </p:ext>
-    </p:extLst>
-  </p:cSld>
-  <p:clrMapOvr>
-    <a:masterClrMapping/>
-  </p:clrMapOvr>
-  <p:transition xmlns:p14="http://schemas.microsoft.com/office/powerpoint/2010/main"/>
-  <p:timing>
-    <p:tnLst>
-      <p:par>
-        <p:cTn xmlns:p14="http://schemas.microsoft.com/office/powerpoint/2010/main" id="1" dur="indefinite" restart="never" nodeType="tmRoot"/>
-      </p:par>
-    </p:tnLst>
-  </p:timing>
-</p:sld>
-</file>
-
-<file path=ppt/slides/slide59.xml><?xml version="1.0" encoding="utf-8"?>
-<p:sld xmlns:a="http://schemas.openxmlformats.org/drawingml/2006/main" xmlns:r="http://schemas.openxmlformats.org/officeDocument/2006/relationships" xmlns:p="http://schemas.openxmlformats.org/presentationml/2006/main">
-  <p:cSld>
-    <p:spTree>
-      <p:nvGrpSpPr>
-        <p:cNvPr id="1" name=""/>
-        <p:cNvGrpSpPr/>
-        <p:nvPr/>
-      </p:nvGrpSpPr>
-      <p:grpSpPr>
-        <a:xfrm>
-          <a:off x="0" y="0"/>
-          <a:ext cx="0" cy="0"/>
-          <a:chOff x="0" y="0"/>
-          <a:chExt cx="0" cy="0"/>
-        </a:xfrm>
-      </p:grpSpPr>
-      <p:sp>
-        <p:nvSpPr>
-          <p:cNvPr id="4" name="Content Placeholder 3"/>
-          <p:cNvSpPr>
-            <a:spLocks noGrp="1"/>
-          </p:cNvSpPr>
-          <p:nvPr>
-            <p:ph sz="quarter" idx="11"/>
-          </p:nvPr>
-        </p:nvSpPr>
-        <p:spPr>
-          <a:xfrm>
-            <a:off x="414337" y="495300"/>
-            <a:ext cx="6400800" cy="304800"/>
-          </a:xfrm>
-        </p:spPr>
-        <p:txBody>
-          <a:bodyPr/>
-          <a:lstStyle/>
-          <a:p>
-            <a:pPr eaLnBrk="1" hangingPunct="1">
-              <a:lnSpc>
-                <a:spcPts val="2448"/>
-              </a:lnSpc>
-              <a:defRPr/>
-            </a:pPr>
-            <a:r>
-              <a:rPr lang="en-US" dirty="0" smtClean="0"/>
-              <a:t>Random forests</a:t>
-            </a:r>
-            <a:endParaRPr lang="en-US" dirty="0"/>
-          </a:p>
-        </p:txBody>
-      </p:sp>
-      <p:sp>
-        <p:nvSpPr>
-          <p:cNvPr id="8" name="Slide Number Placeholder 3"/>
-          <p:cNvSpPr>
-            <a:spLocks noGrp="1"/>
-          </p:cNvSpPr>
-          <p:nvPr>
-            <p:ph type="sldNum" sz="quarter" idx="13"/>
-          </p:nvPr>
-        </p:nvSpPr>
-        <p:spPr/>
-        <p:txBody>
-          <a:bodyPr/>
-          <a:lstStyle/>
-          <a:p>
-            <a:pPr>
-              <a:defRPr/>
-            </a:pPr>
-            <a:fld id="{BD5AD749-DAD1-6A4A-A2AA-CB20EAD0AEB7}" type="slidenum">
-              <a:rPr lang="en-US"/>
-              <a:pPr>
-                <a:defRPr/>
-              </a:pPr>
-              <a:t>59</a:t>
-            </a:fld>
-            <a:endParaRPr lang="en-US"/>
-          </a:p>
-        </p:txBody>
-      </p:sp>
-      <p:sp>
-        <p:nvSpPr>
-          <p:cNvPr id="9" name="TextBox 8"/>
-          <p:cNvSpPr txBox="1"/>
-          <p:nvPr/>
-        </p:nvSpPr>
-        <p:spPr>
-          <a:xfrm>
-            <a:off x="566737" y="1028700"/>
-            <a:ext cx="8382000" cy="3170099"/>
-          </a:xfrm>
-          <a:prstGeom prst="rect">
-            <a:avLst/>
-          </a:prstGeom>
-          <a:noFill/>
-        </p:spPr>
-        <p:txBody>
-          <a:bodyPr wrap="square" rtlCol="0">
-            <a:spAutoFit/>
-          </a:bodyPr>
-          <a:lstStyle/>
-          <a:p>
-            <a:pPr algn="l"/>
-            <a:r>
-              <a:rPr lang="en-US" sz="2500" dirty="0" smtClean="0">
-                <a:latin typeface="PFDinTextCompPro-Italic"/>
-                <a:cs typeface="PFDinTextCompPro-Italic"/>
-              </a:rPr>
-              <a:t>A random forest is an ensemble of decision trees where each base classifier is grown using a random effect.</a:t>
-            </a:r>
-          </a:p>
-          <a:p>
-            <a:pPr algn="l"/>
-            <a:endParaRPr lang="en-US" sz="2500" dirty="0">
-              <a:latin typeface="PFDinTextCompPro-Italic"/>
-              <a:cs typeface="PFDinTextCompPro-Italic"/>
-            </a:endParaRPr>
-          </a:p>
-          <a:p>
-            <a:pPr algn="l"/>
-            <a:r>
-              <a:rPr lang="en-US" sz="2500" dirty="0" smtClean="0">
-                <a:latin typeface="PFDinTextCompPro-Italic"/>
-                <a:cs typeface="PFDinTextCompPro-Italic"/>
-              </a:rPr>
-              <a:t>One way to do this is to randomly choose </a:t>
-            </a:r>
-            <a:r>
-              <a:rPr lang="en-US" sz="2500" dirty="0">
-                <a:latin typeface="PFDinTextCompPro-Italic"/>
-                <a:cs typeface="PFDinTextCompPro-Italic"/>
-              </a:rPr>
-              <a:t>one of the top </a:t>
-            </a:r>
-            <a:r>
-              <a:rPr lang="en-US" sz="2500" i="1" dirty="0">
-                <a:latin typeface="+mn-lt"/>
-                <a:cs typeface="PFDinTextCompPro-Italic"/>
-              </a:rPr>
-              <a:t>k</a:t>
-            </a:r>
-            <a:r>
-              <a:rPr lang="en-US" sz="2500" dirty="0">
-                <a:latin typeface="PFDinTextCompPro-Italic"/>
-                <a:cs typeface="PFDinTextCompPro-Italic"/>
-              </a:rPr>
-              <a:t> </a:t>
-            </a:r>
-            <a:r>
-              <a:rPr lang="en-US" sz="2500" dirty="0" smtClean="0">
-                <a:latin typeface="PFDinTextCompPro-Italic"/>
-                <a:cs typeface="PFDinTextCompPro-Italic"/>
-              </a:rPr>
-              <a:t>features to split each </a:t>
-            </a:r>
-            <a:r>
-              <a:rPr lang="en-US" sz="2500" dirty="0">
-                <a:latin typeface="PFDinTextCompPro-Italic"/>
-                <a:cs typeface="PFDinTextCompPro-Italic"/>
-              </a:rPr>
-              <a:t>node.</a:t>
-            </a:r>
-          </a:p>
-          <a:p>
-            <a:pPr algn="l"/>
-            <a:endParaRPr lang="en-US" sz="2500" dirty="0" smtClean="0">
-              <a:latin typeface="PFDinTextCompPro-Italic"/>
-              <a:cs typeface="PFDinTextCompPro-Italic"/>
-            </a:endParaRPr>
-          </a:p>
-          <a:p>
-            <a:pPr algn="l"/>
-            <a:r>
-              <a:rPr lang="en-US" sz="2500" dirty="0">
-                <a:latin typeface="PFDinTextCompPro-Italic"/>
-                <a:cs typeface="PFDinTextCompPro-Italic"/>
-              </a:rPr>
-              <a:t>For a small number of features, we can </a:t>
-            </a:r>
-            <a:r>
-              <a:rPr lang="en-US" sz="2500" dirty="0" smtClean="0">
-                <a:latin typeface="PFDinTextCompPro-Italic"/>
-                <a:cs typeface="PFDinTextCompPro-Italic"/>
-              </a:rPr>
-              <a:t>also create </a:t>
-            </a:r>
-            <a:r>
-              <a:rPr lang="en-US" sz="2500" dirty="0">
-                <a:latin typeface="PFDinTextCompPro-Italic"/>
-                <a:cs typeface="PFDinTextCompPro-Italic"/>
-              </a:rPr>
-              <a:t>linear combinations of features and select splits from the enhanced feature set (Forest-RC)</a:t>
-            </a:r>
-            <a:r>
-              <a:rPr lang="en-US" sz="2500" dirty="0" smtClean="0">
-                <a:latin typeface="PFDinTextCompPro-Italic"/>
-                <a:cs typeface="PFDinTextCompPro-Italic"/>
-              </a:rPr>
-              <a:t>.</a:t>
-            </a:r>
-            <a:endParaRPr lang="en-US" sz="2500" dirty="0">
-              <a:latin typeface="PFDinTextCompPro-Italic"/>
-              <a:cs typeface="PFDinTextCompPro-Italic"/>
-            </a:endParaRPr>
-          </a:p>
-        </p:txBody>
-      </p:sp>
-    </p:spTree>
-    <p:extLst>
-      <p:ext uri="{BB962C8B-B14F-4D97-AF65-F5344CB8AC3E}">
-        <p14:creationId xmlns:p14="http://schemas.microsoft.com/office/powerpoint/2010/main" val="1994573487"/>
+        <p14:creationId xmlns:p14="http://schemas.microsoft.com/office/powerpoint/2010/main" val="2564836905"/>
       </p:ext>
     </p:extLst>
   </p:cSld>
@@ -26736,514 +26180,6 @@
     <p:extLst>
       <p:ext uri="{BB962C8B-B14F-4D97-AF65-F5344CB8AC3E}">
         <p14:creationId xmlns:p14="http://schemas.microsoft.com/office/powerpoint/2010/main" val="3864437557"/>
-      </p:ext>
-    </p:extLst>
-  </p:cSld>
-  <p:clrMapOvr>
-    <a:masterClrMapping/>
-  </p:clrMapOvr>
-  <p:transition xmlns:p14="http://schemas.microsoft.com/office/powerpoint/2010/main"/>
-  <p:timing>
-    <p:tnLst>
-      <p:par>
-        <p:cTn xmlns:p14="http://schemas.microsoft.com/office/powerpoint/2010/main" id="1" dur="indefinite" restart="never" nodeType="tmRoot"/>
-      </p:par>
-    </p:tnLst>
-  </p:timing>
-</p:sld>
-</file>
-
-<file path=ppt/slides/slide60.xml><?xml version="1.0" encoding="utf-8"?>
-<p:sld xmlns:a="http://schemas.openxmlformats.org/drawingml/2006/main" xmlns:r="http://schemas.openxmlformats.org/officeDocument/2006/relationships" xmlns:p="http://schemas.openxmlformats.org/presentationml/2006/main">
-  <p:cSld>
-    <p:spTree>
-      <p:nvGrpSpPr>
-        <p:cNvPr id="1" name=""/>
-        <p:cNvGrpSpPr/>
-        <p:nvPr/>
-      </p:nvGrpSpPr>
-      <p:grpSpPr>
-        <a:xfrm>
-          <a:off x="0" y="0"/>
-          <a:ext cx="0" cy="0"/>
-          <a:chOff x="0" y="0"/>
-          <a:chExt cx="0" cy="0"/>
-        </a:xfrm>
-      </p:grpSpPr>
-      <p:sp>
-        <p:nvSpPr>
-          <p:cNvPr id="4" name="Content Placeholder 3"/>
-          <p:cNvSpPr>
-            <a:spLocks noGrp="1"/>
-          </p:cNvSpPr>
-          <p:nvPr>
-            <p:ph sz="quarter" idx="11"/>
-          </p:nvPr>
-        </p:nvSpPr>
-        <p:spPr>
-          <a:xfrm>
-            <a:off x="414337" y="495300"/>
-            <a:ext cx="6400800" cy="304800"/>
-          </a:xfrm>
-        </p:spPr>
-        <p:txBody>
-          <a:bodyPr/>
-          <a:lstStyle/>
-          <a:p>
-            <a:pPr eaLnBrk="1" hangingPunct="1">
-              <a:lnSpc>
-                <a:spcPts val="2448"/>
-              </a:lnSpc>
-              <a:defRPr/>
-            </a:pPr>
-            <a:r>
-              <a:rPr lang="en-US" dirty="0" smtClean="0"/>
-              <a:t>Random forests</a:t>
-            </a:r>
-            <a:endParaRPr lang="en-US" dirty="0"/>
-          </a:p>
-        </p:txBody>
-      </p:sp>
-      <p:sp>
-        <p:nvSpPr>
-          <p:cNvPr id="8" name="Slide Number Placeholder 3"/>
-          <p:cNvSpPr>
-            <a:spLocks noGrp="1"/>
-          </p:cNvSpPr>
-          <p:nvPr>
-            <p:ph type="sldNum" sz="quarter" idx="13"/>
-          </p:nvPr>
-        </p:nvSpPr>
-        <p:spPr/>
-        <p:txBody>
-          <a:bodyPr/>
-          <a:lstStyle/>
-          <a:p>
-            <a:pPr>
-              <a:defRPr/>
-            </a:pPr>
-            <a:fld id="{BD5AD749-DAD1-6A4A-A2AA-CB20EAD0AEB7}" type="slidenum">
-              <a:rPr lang="en-US"/>
-              <a:pPr>
-                <a:defRPr/>
-              </a:pPr>
-              <a:t>60</a:t>
-            </a:fld>
-            <a:endParaRPr lang="en-US"/>
-          </a:p>
-        </p:txBody>
-      </p:sp>
-      <p:sp>
-        <p:nvSpPr>
-          <p:cNvPr id="9" name="TextBox 8"/>
-          <p:cNvSpPr txBox="1"/>
-          <p:nvPr/>
-        </p:nvSpPr>
-        <p:spPr>
-          <a:xfrm>
-            <a:off x="566737" y="1028700"/>
-            <a:ext cx="8382000" cy="3939540"/>
-          </a:xfrm>
-          <a:prstGeom prst="rect">
-            <a:avLst/>
-          </a:prstGeom>
-          <a:noFill/>
-        </p:spPr>
-        <p:txBody>
-          <a:bodyPr wrap="square" rtlCol="0">
-            <a:spAutoFit/>
-          </a:bodyPr>
-          <a:lstStyle/>
-          <a:p>
-            <a:pPr algn="l"/>
-            <a:r>
-              <a:rPr lang="en-US" sz="2500" dirty="0" smtClean="0">
-                <a:latin typeface="PFDinTextCompPro-Italic"/>
-                <a:cs typeface="PFDinTextCompPro-Italic"/>
-              </a:rPr>
-              <a:t>A random forest is an ensemble of decision trees where each base classifier is grown using a random effect.</a:t>
-            </a:r>
-          </a:p>
-          <a:p>
-            <a:pPr algn="l"/>
-            <a:endParaRPr lang="en-US" sz="2500" dirty="0">
-              <a:latin typeface="PFDinTextCompPro-Italic"/>
-              <a:cs typeface="PFDinTextCompPro-Italic"/>
-            </a:endParaRPr>
-          </a:p>
-          <a:p>
-            <a:pPr algn="l"/>
-            <a:r>
-              <a:rPr lang="en-US" sz="2500" dirty="0" smtClean="0">
-                <a:latin typeface="PFDinTextCompPro-Italic"/>
-                <a:cs typeface="PFDinTextCompPro-Italic"/>
-              </a:rPr>
-              <a:t>One way to do this is to randomly choose </a:t>
-            </a:r>
-            <a:r>
-              <a:rPr lang="en-US" sz="2500" dirty="0">
-                <a:latin typeface="PFDinTextCompPro-Italic"/>
-                <a:cs typeface="PFDinTextCompPro-Italic"/>
-              </a:rPr>
-              <a:t>one of the top </a:t>
-            </a:r>
-            <a:r>
-              <a:rPr lang="en-US" sz="2500" i="1" dirty="0">
-                <a:latin typeface="+mn-lt"/>
-                <a:cs typeface="PFDinTextCompPro-Italic"/>
-              </a:rPr>
-              <a:t>k</a:t>
-            </a:r>
-            <a:r>
-              <a:rPr lang="en-US" sz="2500" dirty="0">
-                <a:latin typeface="PFDinTextCompPro-Italic"/>
-                <a:cs typeface="PFDinTextCompPro-Italic"/>
-              </a:rPr>
-              <a:t> </a:t>
-            </a:r>
-            <a:r>
-              <a:rPr lang="en-US" sz="2500" dirty="0" smtClean="0">
-                <a:latin typeface="PFDinTextCompPro-Italic"/>
-                <a:cs typeface="PFDinTextCompPro-Italic"/>
-              </a:rPr>
-              <a:t>features to split each </a:t>
-            </a:r>
-            <a:r>
-              <a:rPr lang="en-US" sz="2500" dirty="0">
-                <a:latin typeface="PFDinTextCompPro-Italic"/>
-                <a:cs typeface="PFDinTextCompPro-Italic"/>
-              </a:rPr>
-              <a:t>node.</a:t>
-            </a:r>
-          </a:p>
-          <a:p>
-            <a:pPr algn="l"/>
-            <a:endParaRPr lang="en-US" sz="2500" dirty="0" smtClean="0">
-              <a:latin typeface="PFDinTextCompPro-Italic"/>
-              <a:cs typeface="PFDinTextCompPro-Italic"/>
-            </a:endParaRPr>
-          </a:p>
-          <a:p>
-            <a:pPr algn="l"/>
-            <a:r>
-              <a:rPr lang="en-US" sz="2500" dirty="0">
-                <a:latin typeface="PFDinTextCompPro-Italic"/>
-                <a:cs typeface="PFDinTextCompPro-Italic"/>
-              </a:rPr>
-              <a:t>For a small number of features, we can </a:t>
-            </a:r>
-            <a:r>
-              <a:rPr lang="en-US" sz="2500" dirty="0" smtClean="0">
-                <a:latin typeface="PFDinTextCompPro-Italic"/>
-                <a:cs typeface="PFDinTextCompPro-Italic"/>
-              </a:rPr>
-              <a:t>also create </a:t>
-            </a:r>
-            <a:r>
-              <a:rPr lang="en-US" sz="2500" dirty="0">
-                <a:latin typeface="PFDinTextCompPro-Italic"/>
-                <a:cs typeface="PFDinTextCompPro-Italic"/>
-              </a:rPr>
-              <a:t>linear combinations of features and select splits from the enhanced feature set (Forest-RC).</a:t>
-            </a:r>
-          </a:p>
-          <a:p>
-            <a:pPr algn="l"/>
-            <a:endParaRPr lang="en-US" sz="2500" dirty="0" smtClean="0">
-              <a:latin typeface="PFDinTextCompPro-Italic"/>
-              <a:cs typeface="PFDinTextCompPro-Italic"/>
-            </a:endParaRPr>
-          </a:p>
-          <a:p>
-            <a:pPr algn="l"/>
-            <a:r>
-              <a:rPr lang="en-US" sz="2500" dirty="0" smtClean="0">
-                <a:latin typeface="PFDinTextCompPro-Italic"/>
-                <a:cs typeface="PFDinTextCompPro-Italic"/>
-              </a:rPr>
-              <a:t>Or, we can select splitting features completely at random (Forest-RI).</a:t>
-            </a:r>
-            <a:endParaRPr lang="en-US" sz="2500" dirty="0">
-              <a:latin typeface="PFDinTextCompPro-Italic"/>
-              <a:cs typeface="PFDinTextCompPro-Italic"/>
-            </a:endParaRPr>
-          </a:p>
-        </p:txBody>
-      </p:sp>
-    </p:spTree>
-    <p:extLst>
-      <p:ext uri="{BB962C8B-B14F-4D97-AF65-F5344CB8AC3E}">
-        <p14:creationId xmlns:p14="http://schemas.microsoft.com/office/powerpoint/2010/main" val="1994573487"/>
-      </p:ext>
-    </p:extLst>
-  </p:cSld>
-  <p:clrMapOvr>
-    <a:masterClrMapping/>
-  </p:clrMapOvr>
-  <p:transition xmlns:p14="http://schemas.microsoft.com/office/powerpoint/2010/main"/>
-  <p:timing>
-    <p:tnLst>
-      <p:par>
-        <p:cTn xmlns:p14="http://schemas.microsoft.com/office/powerpoint/2010/main" id="1" dur="indefinite" restart="never" nodeType="tmRoot"/>
-      </p:par>
-    </p:tnLst>
-  </p:timing>
-</p:sld>
-</file>
-
-<file path=ppt/slides/slide61.xml><?xml version="1.0" encoding="utf-8"?>
-<p:sld xmlns:a="http://schemas.openxmlformats.org/drawingml/2006/main" xmlns:r="http://schemas.openxmlformats.org/officeDocument/2006/relationships" xmlns:p="http://schemas.openxmlformats.org/presentationml/2006/main">
-  <p:cSld>
-    <p:spTree>
-      <p:nvGrpSpPr>
-        <p:cNvPr id="1" name=""/>
-        <p:cNvGrpSpPr/>
-        <p:nvPr/>
-      </p:nvGrpSpPr>
-      <p:grpSpPr>
-        <a:xfrm>
-          <a:off x="0" y="0"/>
-          <a:ext cx="0" cy="0"/>
-          <a:chOff x="0" y="0"/>
-          <a:chExt cx="0" cy="0"/>
-        </a:xfrm>
-      </p:grpSpPr>
-      <p:sp>
-        <p:nvSpPr>
-          <p:cNvPr id="4" name="Content Placeholder 3"/>
-          <p:cNvSpPr>
-            <a:spLocks noGrp="1"/>
-          </p:cNvSpPr>
-          <p:nvPr>
-            <p:ph sz="quarter" idx="11"/>
-          </p:nvPr>
-        </p:nvSpPr>
-        <p:spPr>
-          <a:xfrm>
-            <a:off x="414337" y="495300"/>
-            <a:ext cx="6400800" cy="304800"/>
-          </a:xfrm>
-        </p:spPr>
-        <p:txBody>
-          <a:bodyPr/>
-          <a:lstStyle/>
-          <a:p>
-            <a:pPr eaLnBrk="1" hangingPunct="1">
-              <a:lnSpc>
-                <a:spcPts val="2448"/>
-              </a:lnSpc>
-              <a:defRPr/>
-            </a:pPr>
-            <a:r>
-              <a:rPr lang="en-US" dirty="0" smtClean="0"/>
-              <a:t>Random forests</a:t>
-            </a:r>
-            <a:endParaRPr lang="en-US" dirty="0"/>
-          </a:p>
-        </p:txBody>
-      </p:sp>
-      <p:sp>
-        <p:nvSpPr>
-          <p:cNvPr id="8" name="Slide Number Placeholder 3"/>
-          <p:cNvSpPr>
-            <a:spLocks noGrp="1"/>
-          </p:cNvSpPr>
-          <p:nvPr>
-            <p:ph type="sldNum" sz="quarter" idx="13"/>
-          </p:nvPr>
-        </p:nvSpPr>
-        <p:spPr/>
-        <p:txBody>
-          <a:bodyPr/>
-          <a:lstStyle/>
-          <a:p>
-            <a:pPr>
-              <a:defRPr/>
-            </a:pPr>
-            <a:fld id="{BD5AD749-DAD1-6A4A-A2AA-CB20EAD0AEB7}" type="slidenum">
-              <a:rPr lang="en-US"/>
-              <a:pPr>
-                <a:defRPr/>
-              </a:pPr>
-              <a:t>61</a:t>
-            </a:fld>
-            <a:endParaRPr lang="en-US"/>
-          </a:p>
-        </p:txBody>
-      </p:sp>
-      <p:sp>
-        <p:nvSpPr>
-          <p:cNvPr id="9" name="TextBox 8"/>
-          <p:cNvSpPr txBox="1"/>
-          <p:nvPr/>
-        </p:nvSpPr>
-        <p:spPr>
-          <a:xfrm>
-            <a:off x="566737" y="1028700"/>
-            <a:ext cx="8382000" cy="1246495"/>
-          </a:xfrm>
-          <a:prstGeom prst="rect">
-            <a:avLst/>
-          </a:prstGeom>
-          <a:noFill/>
-        </p:spPr>
-        <p:txBody>
-          <a:bodyPr wrap="square" rtlCol="0">
-            <a:spAutoFit/>
-          </a:bodyPr>
-          <a:lstStyle/>
-          <a:p>
-            <a:pPr algn="l"/>
-            <a:r>
-              <a:rPr lang="en-US" sz="2500" dirty="0" smtClean="0">
-                <a:latin typeface="PFDinTextCompPro-Italic"/>
-                <a:cs typeface="PFDinTextCompPro-Italic"/>
-              </a:rPr>
-              <a:t>Random forests are about as accurate as </a:t>
-            </a:r>
-            <a:r>
-              <a:rPr lang="en-US" sz="2500" dirty="0" err="1" smtClean="0">
-                <a:latin typeface="PFDinTextCompPro-Italic"/>
-                <a:cs typeface="PFDinTextCompPro-Italic"/>
-              </a:rPr>
-              <a:t>AdaBoost</a:t>
-            </a:r>
-            <a:r>
-              <a:rPr lang="en-US" sz="2500" dirty="0" smtClean="0">
-                <a:latin typeface="PFDinTextCompPro-Italic"/>
-                <a:cs typeface="PFDinTextCompPro-Italic"/>
-              </a:rPr>
-              <a:t>, more robust to noise, and can also have better runtime than other ensemble methods (since the feature space is reduced in some cases).</a:t>
-            </a:r>
-            <a:endParaRPr lang="en-US" sz="2500" dirty="0">
-              <a:latin typeface="PFDinTextCompPro-Italic"/>
-              <a:cs typeface="PFDinTextCompPro-Italic"/>
-            </a:endParaRPr>
-          </a:p>
-        </p:txBody>
-      </p:sp>
-    </p:spTree>
-    <p:extLst>
-      <p:ext uri="{BB962C8B-B14F-4D97-AF65-F5344CB8AC3E}">
-        <p14:creationId xmlns:p14="http://schemas.microsoft.com/office/powerpoint/2010/main" val="2793443667"/>
-      </p:ext>
-    </p:extLst>
-  </p:cSld>
-  <p:clrMapOvr>
-    <a:masterClrMapping/>
-  </p:clrMapOvr>
-  <p:transition xmlns:p14="http://schemas.microsoft.com/office/powerpoint/2010/main"/>
-  <p:timing>
-    <p:tnLst>
-      <p:par>
-        <p:cTn xmlns:p14="http://schemas.microsoft.com/office/powerpoint/2010/main" id="1" dur="indefinite" restart="never" nodeType="tmRoot"/>
-      </p:par>
-    </p:tnLst>
-  </p:timing>
-</p:sld>
-</file>
-
-<file path=ppt/slides/slide62.xml><?xml version="1.0" encoding="utf-8"?>
-<p:sld xmlns:a="http://schemas.openxmlformats.org/drawingml/2006/main" xmlns:r="http://schemas.openxmlformats.org/officeDocument/2006/relationships" xmlns:p="http://schemas.openxmlformats.org/presentationml/2006/main">
-  <p:cSld>
-    <p:spTree>
-      <p:nvGrpSpPr>
-        <p:cNvPr id="1" name=""/>
-        <p:cNvGrpSpPr/>
-        <p:nvPr/>
-      </p:nvGrpSpPr>
-      <p:grpSpPr>
-        <a:xfrm>
-          <a:off x="0" y="0"/>
-          <a:ext cx="0" cy="0"/>
-          <a:chOff x="0" y="0"/>
-          <a:chExt cx="0" cy="0"/>
-        </a:xfrm>
-      </p:grpSpPr>
-      <p:sp>
-        <p:nvSpPr>
-          <p:cNvPr id="2" name="Title 1"/>
-          <p:cNvSpPr>
-            <a:spLocks noGrp="1"/>
-          </p:cNvSpPr>
-          <p:nvPr>
-            <p:ph type="title"/>
-          </p:nvPr>
-        </p:nvSpPr>
-        <p:spPr>
-          <a:xfrm>
-            <a:off x="347663" y="3467100"/>
-            <a:ext cx="8426450" cy="1828800"/>
-          </a:xfrm>
-        </p:spPr>
-        <p:txBody>
-          <a:bodyPr/>
-          <a:lstStyle/>
-          <a:p>
-            <a:pPr>
-              <a:defRPr/>
-            </a:pPr>
-            <a:r>
-              <a:rPr lang="en-US" sz="7500" dirty="0" smtClean="0"/>
-              <a:t>Ex: ensemble methods in </a:t>
-            </a:r>
-            <a:r>
-              <a:rPr lang="en-US" sz="7500" dirty="0" err="1" smtClean="0"/>
-              <a:t>scikit</a:t>
-            </a:r>
-            <a:r>
-              <a:rPr lang="en-US" sz="7500" dirty="0" smtClean="0"/>
-              <a:t>-learn</a:t>
-            </a:r>
-            <a:endParaRPr lang="en-US" sz="7500" dirty="0"/>
-          </a:p>
-        </p:txBody>
-      </p:sp>
-      <p:sp>
-        <p:nvSpPr>
-          <p:cNvPr id="4" name="Content Placeholder 3"/>
-          <p:cNvSpPr>
-            <a:spLocks noGrp="1"/>
-          </p:cNvSpPr>
-          <p:nvPr>
-            <p:ph sz="quarter" idx="11"/>
-          </p:nvPr>
-        </p:nvSpPr>
-        <p:spPr>
-          <a:xfrm>
-            <a:off x="371475" y="495300"/>
-            <a:ext cx="6400800" cy="304800"/>
-          </a:xfrm>
-        </p:spPr>
-        <p:txBody>
-          <a:bodyPr wrap="square" lIns="91440" tIns="45720" rIns="91440" bIns="45720" numCol="1" anchor="t" anchorCtr="0" compatLnSpc="1">
-            <a:prstTxWarp prst="textNoShape">
-              <a:avLst/>
-            </a:prstTxWarp>
-          </a:bodyPr>
-          <a:lstStyle/>
-          <a:p>
-            <a:pPr marL="0" indent="0"/>
-            <a:r>
-              <a:rPr lang="en-US" cap="none" dirty="0" smtClean="0">
-                <a:latin typeface="PFDinTextCompPro-Bold" charset="0"/>
-                <a:ea typeface="ヒラギノ角ゴ ProN W3" charset="0"/>
-                <a:cs typeface="ヒラギノ角ゴ ProN W3" charset="0"/>
-              </a:rPr>
-              <a:t>INTRO TO DATA SCIENCE</a:t>
-            </a:r>
-            <a:endParaRPr lang="en-US" cap="none" dirty="0">
-              <a:latin typeface="PFDinTextCompPro-Bold" charset="0"/>
-              <a:ea typeface="ヒラギノ角ゴ ProN W3" charset="0"/>
-              <a:cs typeface="ヒラギノ角ゴ ProN W3" charset="0"/>
-            </a:endParaRPr>
-          </a:p>
-        </p:txBody>
-      </p:sp>
-    </p:spTree>
-    <p:extLst>
-      <p:ext uri="{BB962C8B-B14F-4D97-AF65-F5344CB8AC3E}">
-        <p14:creationId xmlns:p14="http://schemas.microsoft.com/office/powerpoint/2010/main" val="2564836905"/>
       </p:ext>
     </p:extLst>
   </p:cSld>
@@ -27650,7 +26586,19 @@
                   <a:cs typeface="PFDinTextCompPro-Italic"/>
                   <a:sym typeface="News706 BT" charset="0"/>
                 </a:rPr>
-                <a:t>Base classifiers and ensemble classifiers are sometimes called </a:t>
+                <a:t>These base classifiers are </a:t>
+              </a:r>
+              <a:r>
+                <a:rPr lang="en-US" sz="900" dirty="0" smtClean="0">
+                  <a:solidFill>
+                    <a:schemeClr val="tx1"/>
+                  </a:solidFill>
+                  <a:latin typeface="+mn-lt"/>
+                  <a:ea typeface="ＭＳ Ｐゴシック" charset="0"/>
+                  <a:cs typeface="PFDinTextCompPro-Italic"/>
+                  <a:sym typeface="News706 BT" charset="0"/>
+                </a:rPr>
+                <a:t>sometimes called </a:t>
               </a:r>
               <a:r>
                 <a:rPr lang="en-US" sz="900" i="1" dirty="0" smtClean="0">
@@ -27662,19 +26610,7 @@
                   <a:cs typeface="PFDinTextCompPro-Italic"/>
                   <a:sym typeface="News706 BT" charset="0"/>
                 </a:rPr>
-                <a:t>weak learners</a:t>
-              </a:r>
-              <a:r>
-                <a:rPr lang="en-US" sz="900" dirty="0" smtClean="0">
-                  <a:solidFill>
-                    <a:schemeClr val="tx1"/>
-                  </a:solidFill>
-                  <a:latin typeface="+mn-lt"/>
-                  <a:ea typeface="ＭＳ Ｐゴシック" charset="0"/>
-                  <a:cs typeface="PFDinTextCompPro-Italic"/>
-                  <a:sym typeface="News706 BT" charset="0"/>
-                </a:rPr>
-                <a:t> and </a:t>
+                <a:t>weak </a:t>
               </a:r>
               <a:r>
                 <a:rPr lang="en-US" sz="900" i="1" dirty="0" smtClean="0">
@@ -27686,7 +26622,7 @@
                   <a:cs typeface="PFDinTextCompPro-Italic"/>
                   <a:sym typeface="News706 BT" charset="0"/>
                 </a:rPr>
-                <a:t>strong learners</a:t>
+                <a:t>learners</a:t>
               </a:r>
               <a:r>
                 <a:rPr lang="en-US" sz="900" dirty="0" smtClean="0">

</xml_diff>